<commit_message>
Adicionado server das demos
</commit_message>
<xml_diff>
--- a/ppts/Modulo 4/5485 - M04A01.pptx
+++ b/ppts/Modulo 4/5485 - M04A01.pptx
@@ -9,23 +9,34 @@
     <p:sldId id="286" r:id="rId3"/>
     <p:sldId id="347" r:id="rId4"/>
     <p:sldId id="348" r:id="rId5"/>
-    <p:sldId id="295" r:id="rId6"/>
-    <p:sldId id="359" r:id="rId7"/>
-    <p:sldId id="349" r:id="rId8"/>
-    <p:sldId id="360" r:id="rId9"/>
-    <p:sldId id="361" r:id="rId10"/>
-    <p:sldId id="350" r:id="rId11"/>
-    <p:sldId id="362" r:id="rId12"/>
-    <p:sldId id="363" r:id="rId13"/>
-    <p:sldId id="351" r:id="rId14"/>
-    <p:sldId id="364" r:id="rId15"/>
-    <p:sldId id="352" r:id="rId16"/>
-    <p:sldId id="353" r:id="rId17"/>
-    <p:sldId id="354" r:id="rId18"/>
-    <p:sldId id="355" r:id="rId19"/>
-    <p:sldId id="356" r:id="rId20"/>
-    <p:sldId id="357" r:id="rId21"/>
-    <p:sldId id="358" r:id="rId22"/>
+    <p:sldId id="365" r:id="rId6"/>
+    <p:sldId id="366" r:id="rId7"/>
+    <p:sldId id="295" r:id="rId8"/>
+    <p:sldId id="359" r:id="rId9"/>
+    <p:sldId id="349" r:id="rId10"/>
+    <p:sldId id="360" r:id="rId11"/>
+    <p:sldId id="361" r:id="rId12"/>
+    <p:sldId id="350" r:id="rId13"/>
+    <p:sldId id="362" r:id="rId14"/>
+    <p:sldId id="363" r:id="rId15"/>
+    <p:sldId id="351" r:id="rId16"/>
+    <p:sldId id="364" r:id="rId17"/>
+    <p:sldId id="367" r:id="rId18"/>
+    <p:sldId id="352" r:id="rId19"/>
+    <p:sldId id="368" r:id="rId20"/>
+    <p:sldId id="369" r:id="rId21"/>
+    <p:sldId id="370" r:id="rId22"/>
+    <p:sldId id="371" r:id="rId23"/>
+    <p:sldId id="354" r:id="rId24"/>
+    <p:sldId id="372" r:id="rId25"/>
+    <p:sldId id="373" r:id="rId26"/>
+    <p:sldId id="355" r:id="rId27"/>
+    <p:sldId id="374" r:id="rId28"/>
+    <p:sldId id="375" r:id="rId29"/>
+    <p:sldId id="356" r:id="rId30"/>
+    <p:sldId id="376" r:id="rId31"/>
+    <p:sldId id="377" r:id="rId32"/>
+    <p:sldId id="378" r:id="rId33"/>
   </p:sldIdLst>
   <p:sldSz cx="12192000" cy="6858000"/>
   <p:notesSz cx="6858000" cy="9144000"/>
@@ -126,7 +137,7 @@
   </p:defaultTextStyle>
   <p:extLst>
     <p:ext uri="{EFAFB233-063F-42B5-8137-9DF3F51BA10A}">
-      <p15:sldGuideLst xmlns="" xmlns:p15="http://schemas.microsoft.com/office/powerpoint/2012/main"/>
+      <p15:sldGuideLst xmlns:p15="http://schemas.microsoft.com/office/powerpoint/2012/main" xmlns=""/>
     </p:ext>
   </p:extLst>
 </p:presentation>
@@ -3127,7 +3138,7 @@
           <a:p>
             <a:r>
               <a:rPr lang="pt-BR" dirty="0" smtClean="0"/>
-              <a:t>Listas</a:t>
+              <a:t>DEMO</a:t>
             </a:r>
             <a:endParaRPr lang="pt-BR" dirty="0"/>
           </a:p>
@@ -3135,12 +3146,12 @@
       </p:sp>
       <p:sp>
         <p:nvSpPr>
-          <p:cNvPr id="3" name="Espaço Reservado para Conteúdo 2"/>
-          <p:cNvSpPr>
-            <a:spLocks noGrp="1"/>
-          </p:cNvSpPr>
-          <p:nvPr>
-            <p:ph idx="1"/>
+          <p:cNvPr id="5" name="Espaço Reservado para Conteúdo 4"/>
+          <p:cNvSpPr>
+            <a:spLocks noGrp="1"/>
+          </p:cNvSpPr>
+          <p:nvPr>
+            <p:ph type="body" idx="1"/>
           </p:nvPr>
         </p:nvSpPr>
         <p:spPr/>
@@ -3150,82 +3161,23 @@
           </a:bodyPr>
           <a:lstStyle/>
           <a:p>
-            <a:pPr fontAlgn="base"/>
+            <a:pPr lvl="1" fontAlgn="base"/>
+            <a:r>
+              <a:rPr lang="pt-BR" dirty="0" smtClean="0"/>
+              <a:t>Criando um </a:t>
+            </a:r>
             <a:r>
               <a:rPr lang="pt-BR" dirty="0" err="1" smtClean="0"/>
-              <a:t>Arrays</a:t>
-            </a:r>
-            <a:endParaRPr lang="pt-BR" dirty="0"/>
-          </a:p>
-          <a:p>
-            <a:pPr fontAlgn="base"/>
-            <a:r>
-              <a:rPr lang="pt-BR" dirty="0" err="1"/>
-              <a:t>Ng-repeat</a:t>
-            </a:r>
-            <a:endParaRPr lang="pt-BR" dirty="0"/>
-          </a:p>
-          <a:p>
-            <a:pPr lvl="1" fontAlgn="base"/>
-            <a:r>
-              <a:rPr lang="pt-BR" dirty="0" err="1"/>
-              <a:t>Filter</a:t>
-            </a:r>
-            <a:endParaRPr lang="pt-BR" dirty="0"/>
-          </a:p>
-          <a:p>
-            <a:pPr lvl="1" fontAlgn="base"/>
-            <a:r>
-              <a:rPr lang="pt-BR" dirty="0" err="1"/>
-              <a:t>Order</a:t>
-            </a:r>
-            <a:r>
-              <a:rPr lang="pt-BR" dirty="0"/>
-              <a:t> </a:t>
-            </a:r>
-            <a:r>
-              <a:rPr lang="pt-BR" dirty="0" err="1"/>
-              <a:t>by</a:t>
-            </a:r>
-            <a:endParaRPr lang="pt-BR" dirty="0"/>
-          </a:p>
-          <a:p>
-            <a:pPr fontAlgn="base"/>
-            <a:r>
-              <a:rPr lang="pt-BR" dirty="0" err="1"/>
-              <a:t>Push</a:t>
-            </a:r>
-            <a:endParaRPr lang="pt-BR" dirty="0"/>
-          </a:p>
-          <a:p>
-            <a:pPr fontAlgn="base"/>
-            <a:r>
-              <a:rPr lang="pt-BR" dirty="0"/>
-              <a:t>Splice</a:t>
-            </a:r>
-          </a:p>
-          <a:p>
-            <a:pPr fontAlgn="base"/>
-            <a:r>
-              <a:rPr lang="pt-BR" dirty="0" err="1"/>
-              <a:t>Length</a:t>
-            </a:r>
-            <a:endParaRPr lang="pt-BR" dirty="0"/>
-          </a:p>
-          <a:p>
-            <a:pPr fontAlgn="base"/>
-            <a:r>
-              <a:rPr lang="pt-BR" dirty="0" err="1"/>
-              <a:t>Foreach</a:t>
-            </a:r>
-            <a:endParaRPr lang="pt-BR" dirty="0"/>
+              <a:t>controller</a:t>
+            </a:r>
+            <a:endParaRPr lang="pt-BR" dirty="0" smtClean="0"/>
           </a:p>
         </p:txBody>
       </p:sp>
     </p:spTree>
     <p:extLst>
       <p:ext uri="{BB962C8B-B14F-4D97-AF65-F5344CB8AC3E}">
-        <p14:creationId xmlns:p14="http://schemas.microsoft.com/office/powerpoint/2010/main" val="1057095263"/>
+        <p14:creationId xmlns:p14="http://schemas.microsoft.com/office/powerpoint/2010/main" val="783120885"/>
       </p:ext>
     </p:extLst>
   </p:cSld>
@@ -3293,7 +3245,7 @@
           <a:p>
             <a:r>
               <a:rPr lang="pt-BR" dirty="0" smtClean="0"/>
-              <a:t>DEMO</a:t>
+              <a:t>Listas</a:t>
             </a:r>
             <a:endParaRPr lang="pt-BR" dirty="0"/>
           </a:p>
@@ -3301,7 +3253,7 @@
       </p:sp>
       <p:sp>
         <p:nvSpPr>
-          <p:cNvPr id="5" name="Espaço Reservado para Conteúdo 4"/>
+          <p:cNvPr id="4" name="Espaço Reservado para Texto 3"/>
           <p:cNvSpPr>
             <a:spLocks noGrp="1"/>
           </p:cNvSpPr>
@@ -3311,24 +3263,25 @@
         </p:nvSpPr>
         <p:spPr/>
         <p:txBody>
-          <a:bodyPr numCol="1">
-            <a:normAutofit/>
-          </a:bodyPr>
-          <a:lstStyle/>
-          <a:p>
-            <a:pPr lvl="1" fontAlgn="base"/>
-            <a:r>
-              <a:rPr lang="pt-BR" dirty="0" smtClean="0"/>
-              <a:t>Utilizando listas</a:t>
-            </a:r>
-            <a:endParaRPr lang="pt-BR" dirty="0" smtClean="0"/>
+          <a:bodyPr/>
+          <a:lstStyle/>
+          <a:p>
+            <a:pPr marL="0" lvl="1">
+              <a:spcBef>
+                <a:spcPts val="1000"/>
+              </a:spcBef>
+            </a:pPr>
+            <a:r>
+              <a:rPr lang="pt-BR" dirty="0" smtClean="0"/>
+              <a:t>Módulo 4 – Aula 3</a:t>
+            </a:r>
           </a:p>
         </p:txBody>
       </p:sp>
     </p:spTree>
     <p:extLst>
       <p:ext uri="{BB962C8B-B14F-4D97-AF65-F5344CB8AC3E}">
-        <p14:creationId xmlns:p14="http://schemas.microsoft.com/office/powerpoint/2010/main" val="3343409134"/>
+        <p14:creationId xmlns:p14="http://schemas.microsoft.com/office/powerpoint/2010/main" val="2713542278"/>
       </p:ext>
     </p:extLst>
   </p:cSld>
@@ -3396,7 +3349,7 @@
           <a:p>
             <a:r>
               <a:rPr lang="pt-BR" dirty="0" smtClean="0"/>
-              <a:t>Trabalhando com Dados</a:t>
+              <a:t>Listas</a:t>
             </a:r>
             <a:endParaRPr lang="pt-BR" dirty="0"/>
           </a:p>
@@ -3404,48 +3357,97 @@
       </p:sp>
       <p:sp>
         <p:nvSpPr>
-          <p:cNvPr id="4" name="Espaço Reservado para Texto 3"/>
-          <p:cNvSpPr>
-            <a:spLocks noGrp="1"/>
-          </p:cNvSpPr>
-          <p:nvPr>
-            <p:ph type="body" idx="1"/>
-          </p:nvPr>
-        </p:nvSpPr>
-        <p:spPr/>
-        <p:txBody>
-          <a:bodyPr/>
-          <a:lstStyle/>
-          <a:p>
-            <a:pPr marL="0" lvl="1">
-              <a:spcBef>
-                <a:spcPts val="1000"/>
-              </a:spcBef>
-            </a:pPr>
-            <a:r>
-              <a:rPr lang="pt-BR" dirty="0" smtClean="0"/>
-              <a:t>Módulo </a:t>
-            </a:r>
-            <a:r>
-              <a:rPr lang="pt-BR" dirty="0" smtClean="0"/>
-              <a:t>4 </a:t>
-            </a:r>
-            <a:r>
-              <a:rPr lang="pt-BR" dirty="0" smtClean="0"/>
-              <a:t>– Aula </a:t>
-            </a:r>
-            <a:r>
-              <a:rPr lang="pt-BR" dirty="0" smtClean="0"/>
-              <a:t>4</a:t>
-            </a:r>
-            <a:endParaRPr lang="pt-BR" dirty="0" smtClean="0"/>
+          <p:cNvPr id="3" name="Espaço Reservado para Conteúdo 2"/>
+          <p:cNvSpPr>
+            <a:spLocks noGrp="1"/>
+          </p:cNvSpPr>
+          <p:nvPr>
+            <p:ph idx="1"/>
+          </p:nvPr>
+        </p:nvSpPr>
+        <p:spPr/>
+        <p:txBody>
+          <a:bodyPr numCol="1">
+            <a:normAutofit/>
+          </a:bodyPr>
+          <a:lstStyle/>
+          <a:p>
+            <a:pPr fontAlgn="base"/>
+            <a:r>
+              <a:rPr lang="pt-BR" dirty="0" err="1" smtClean="0"/>
+              <a:t>Arrays</a:t>
+            </a:r>
+            <a:endParaRPr lang="pt-BR" dirty="0"/>
+          </a:p>
+          <a:p>
+            <a:pPr fontAlgn="base"/>
+            <a:r>
+              <a:rPr lang="pt-BR" dirty="0" err="1"/>
+              <a:t>Ng-repeat</a:t>
+            </a:r>
+            <a:endParaRPr lang="pt-BR" dirty="0"/>
+          </a:p>
+          <a:p>
+            <a:pPr lvl="1" fontAlgn="base"/>
+            <a:r>
+              <a:rPr lang="pt-BR" dirty="0" err="1"/>
+              <a:t>Filter</a:t>
+            </a:r>
+            <a:endParaRPr lang="pt-BR" dirty="0"/>
+          </a:p>
+          <a:p>
+            <a:pPr lvl="1" fontAlgn="base"/>
+            <a:r>
+              <a:rPr lang="pt-BR" dirty="0" err="1"/>
+              <a:t>Order</a:t>
+            </a:r>
+            <a:r>
+              <a:rPr lang="pt-BR" dirty="0"/>
+              <a:t> </a:t>
+            </a:r>
+            <a:r>
+              <a:rPr lang="pt-BR" dirty="0" err="1"/>
+              <a:t>by</a:t>
+            </a:r>
+            <a:endParaRPr lang="pt-BR" dirty="0"/>
+          </a:p>
+          <a:p>
+            <a:pPr fontAlgn="base"/>
+            <a:r>
+              <a:rPr lang="pt-BR" dirty="0" err="1"/>
+              <a:t>Push</a:t>
+            </a:r>
+            <a:endParaRPr lang="pt-BR" dirty="0"/>
+          </a:p>
+          <a:p>
+            <a:pPr fontAlgn="base"/>
+            <a:r>
+              <a:rPr lang="pt-BR" dirty="0"/>
+              <a:t>Splice</a:t>
+            </a:r>
+          </a:p>
+          <a:p>
+            <a:pPr fontAlgn="base"/>
+            <a:r>
+              <a:rPr lang="pt-BR" dirty="0" err="1"/>
+              <a:t>Length</a:t>
+            </a:r>
+            <a:endParaRPr lang="pt-BR" dirty="0"/>
+          </a:p>
+          <a:p>
+            <a:pPr fontAlgn="base"/>
+            <a:r>
+              <a:rPr lang="pt-BR" dirty="0" err="1"/>
+              <a:t>Foreach</a:t>
+            </a:r>
+            <a:endParaRPr lang="pt-BR" dirty="0"/>
           </a:p>
         </p:txBody>
       </p:sp>
     </p:spTree>
     <p:extLst>
       <p:ext uri="{BB962C8B-B14F-4D97-AF65-F5344CB8AC3E}">
-        <p14:creationId xmlns:p14="http://schemas.microsoft.com/office/powerpoint/2010/main" val="1896306753"/>
+        <p14:creationId xmlns:p14="http://schemas.microsoft.com/office/powerpoint/2010/main" val="1057095263"/>
       </p:ext>
     </p:extLst>
   </p:cSld>
@@ -3512,12 +3514,8 @@
           <a:lstStyle/>
           <a:p>
             <a:r>
-              <a:rPr lang="pt-BR" dirty="0"/>
-              <a:t>Trabalhando com </a:t>
-            </a:r>
-            <a:r>
-              <a:rPr lang="pt-BR" dirty="0" smtClean="0"/>
-              <a:t>Dados</a:t>
+              <a:rPr lang="pt-BR" dirty="0" smtClean="0"/>
+              <a:t>DEMO</a:t>
             </a:r>
             <a:endParaRPr lang="pt-BR" dirty="0"/>
           </a:p>
@@ -3525,12 +3523,12 @@
       </p:sp>
       <p:sp>
         <p:nvSpPr>
-          <p:cNvPr id="3" name="Espaço Reservado para Conteúdo 2"/>
-          <p:cNvSpPr>
-            <a:spLocks noGrp="1"/>
-          </p:cNvSpPr>
-          <p:nvPr>
-            <p:ph idx="1"/>
+          <p:cNvPr id="5" name="Espaço Reservado para Conteúdo 4"/>
+          <p:cNvSpPr>
+            <a:spLocks noGrp="1"/>
+          </p:cNvSpPr>
+          <p:nvPr>
+            <p:ph type="body" idx="1"/>
           </p:nvPr>
         </p:nvSpPr>
         <p:spPr/>
@@ -3540,47 +3538,18 @@
           </a:bodyPr>
           <a:lstStyle/>
           <a:p>
-            <a:pPr fontAlgn="base"/>
-            <a:r>
-              <a:rPr lang="pt-BR" dirty="0" err="1" smtClean="0"/>
-              <a:t>Tojson</a:t>
-            </a:r>
-            <a:endParaRPr lang="pt-BR" dirty="0"/>
-          </a:p>
-          <a:p>
-            <a:pPr fontAlgn="base"/>
-            <a:r>
-              <a:rPr lang="pt-BR" dirty="0" err="1"/>
-              <a:t>Fromjson</a:t>
-            </a:r>
-            <a:endParaRPr lang="pt-BR" dirty="0"/>
-          </a:p>
-          <a:p>
-            <a:pPr fontAlgn="base"/>
-            <a:r>
-              <a:rPr lang="pt-BR" dirty="0"/>
-              <a:t>Local/</a:t>
-            </a:r>
-            <a:r>
-              <a:rPr lang="pt-BR" dirty="0" err="1"/>
-              <a:t>session</a:t>
-            </a:r>
-            <a:r>
-              <a:rPr lang="pt-BR" dirty="0"/>
-              <a:t> </a:t>
-            </a:r>
-            <a:r>
-              <a:rPr lang="pt-BR" dirty="0" err="1"/>
-              <a:t>storage</a:t>
-            </a:r>
-            <a:endParaRPr lang="pt-BR" dirty="0"/>
+            <a:pPr lvl="1" fontAlgn="base"/>
+            <a:r>
+              <a:rPr lang="pt-BR" dirty="0" smtClean="0"/>
+              <a:t>Utilizando listas</a:t>
+            </a:r>
           </a:p>
         </p:txBody>
       </p:sp>
     </p:spTree>
     <p:extLst>
       <p:ext uri="{BB962C8B-B14F-4D97-AF65-F5344CB8AC3E}">
-        <p14:creationId xmlns:p14="http://schemas.microsoft.com/office/powerpoint/2010/main" val="4036789125"/>
+        <p14:creationId xmlns:p14="http://schemas.microsoft.com/office/powerpoint/2010/main" val="3343409134"/>
       </p:ext>
     </p:extLst>
   </p:cSld>
@@ -3648,7 +3617,7 @@
           <a:p>
             <a:r>
               <a:rPr lang="pt-BR" dirty="0" smtClean="0"/>
-              <a:t>DEMO</a:t>
+              <a:t>Trabalhando com Dados</a:t>
             </a:r>
             <a:endParaRPr lang="pt-BR" dirty="0"/>
           </a:p>
@@ -3656,7 +3625,7 @@
       </p:sp>
       <p:sp>
         <p:nvSpPr>
-          <p:cNvPr id="5" name="Espaço Reservado para Conteúdo 4"/>
+          <p:cNvPr id="4" name="Espaço Reservado para Texto 3"/>
           <p:cNvSpPr>
             <a:spLocks noGrp="1"/>
           </p:cNvSpPr>
@@ -3666,28 +3635,25 @@
         </p:nvSpPr>
         <p:spPr/>
         <p:txBody>
-          <a:bodyPr numCol="1">
-            <a:normAutofit/>
-          </a:bodyPr>
-          <a:lstStyle/>
-          <a:p>
-            <a:pPr lvl="1" fontAlgn="base"/>
-            <a:r>
-              <a:rPr lang="pt-BR" dirty="0" smtClean="0"/>
-              <a:t>Trabalhando </a:t>
-            </a:r>
-            <a:r>
-              <a:rPr lang="pt-BR" smtClean="0"/>
-              <a:t>com dados</a:t>
-            </a:r>
-            <a:endParaRPr lang="pt-BR" dirty="0" smtClean="0"/>
+          <a:bodyPr/>
+          <a:lstStyle/>
+          <a:p>
+            <a:pPr marL="0" lvl="1">
+              <a:spcBef>
+                <a:spcPts val="1000"/>
+              </a:spcBef>
+            </a:pPr>
+            <a:r>
+              <a:rPr lang="pt-BR" dirty="0" smtClean="0"/>
+              <a:t>Módulo 4 – Aula 4</a:t>
+            </a:r>
           </a:p>
         </p:txBody>
       </p:sp>
     </p:spTree>
     <p:extLst>
       <p:ext uri="{BB962C8B-B14F-4D97-AF65-F5344CB8AC3E}">
-        <p14:creationId xmlns:p14="http://schemas.microsoft.com/office/powerpoint/2010/main" val="2066406534"/>
+        <p14:creationId xmlns:p14="http://schemas.microsoft.com/office/powerpoint/2010/main" val="1896306753"/>
       </p:ext>
     </p:extLst>
   </p:cSld>
@@ -3754,8 +3720,12 @@
           <a:lstStyle/>
           <a:p>
             <a:r>
-              <a:rPr lang="pt-BR" dirty="0" smtClean="0"/>
-              <a:t>Outros</a:t>
+              <a:rPr lang="pt-BR" dirty="0"/>
+              <a:t>Trabalhando com </a:t>
+            </a:r>
+            <a:r>
+              <a:rPr lang="pt-BR" dirty="0" smtClean="0"/>
+              <a:t>Dados</a:t>
             </a:r>
             <a:endParaRPr lang="pt-BR" dirty="0"/>
           </a:p>
@@ -3778,61 +3748,38 @@
           </a:bodyPr>
           <a:lstStyle/>
           <a:p>
-            <a:pPr marL="228600" lvl="1" fontAlgn="base">
-              <a:spcBef>
-                <a:spcPts val="1000"/>
-              </a:spcBef>
-            </a:pPr>
-            <a:r>
-              <a:rPr lang="pt-BR" dirty="0" smtClean="0"/>
-              <a:t>Funções </a:t>
-            </a:r>
+            <a:pPr fontAlgn="base"/>
+            <a:r>
+              <a:rPr lang="pt-BR" dirty="0" err="1" smtClean="0"/>
+              <a:t>Tojson</a:t>
+            </a:r>
+            <a:endParaRPr lang="pt-BR" dirty="0"/>
+          </a:p>
+          <a:p>
+            <a:pPr fontAlgn="base"/>
+            <a:r>
+              <a:rPr lang="pt-BR" dirty="0" err="1"/>
+              <a:t>Fromjson</a:t>
+            </a:r>
+            <a:endParaRPr lang="pt-BR" dirty="0"/>
+          </a:p>
+          <a:p>
+            <a:pPr fontAlgn="base"/>
             <a:r>
               <a:rPr lang="pt-BR" dirty="0"/>
-              <a:t>computadas</a:t>
-            </a:r>
-          </a:p>
-          <a:p>
-            <a:pPr marL="228600" lvl="1" fontAlgn="base">
-              <a:spcBef>
-                <a:spcPts val="1000"/>
-              </a:spcBef>
-            </a:pPr>
+              <a:t>Local/</a:t>
+            </a:r>
             <a:r>
               <a:rPr lang="pt-BR" dirty="0" err="1"/>
-              <a:t>Ng</a:t>
+              <a:t>session</a:t>
             </a:r>
             <a:r>
               <a:rPr lang="pt-BR" dirty="0"/>
-              <a:t>-show e </a:t>
+              <a:t> </a:t>
             </a:r>
             <a:r>
               <a:rPr lang="pt-BR" dirty="0" err="1"/>
-              <a:t>ng-hide</a:t>
-            </a:r>
-            <a:endParaRPr lang="pt-BR" dirty="0"/>
-          </a:p>
-          <a:p>
-            <a:pPr marL="228600" lvl="1" fontAlgn="base">
-              <a:spcBef>
-                <a:spcPts val="1000"/>
-              </a:spcBef>
-            </a:pPr>
-            <a:r>
-              <a:rPr lang="pt-BR" dirty="0" err="1"/>
-              <a:t>Ng-if</a:t>
-            </a:r>
-            <a:endParaRPr lang="pt-BR" dirty="0"/>
-          </a:p>
-          <a:p>
-            <a:pPr marL="228600" lvl="1" fontAlgn="base">
-              <a:spcBef>
-                <a:spcPts val="1000"/>
-              </a:spcBef>
-            </a:pPr>
-            <a:r>
-              <a:rPr lang="pt-BR" dirty="0" err="1"/>
-              <a:t>Ng-class</a:t>
+              <a:t>storage</a:t>
             </a:r>
             <a:endParaRPr lang="pt-BR" dirty="0"/>
           </a:p>
@@ -3841,7 +3788,7 @@
     </p:spTree>
     <p:extLst>
       <p:ext uri="{BB962C8B-B14F-4D97-AF65-F5344CB8AC3E}">
-        <p14:creationId xmlns:p14="http://schemas.microsoft.com/office/powerpoint/2010/main" val="857922641"/>
+        <p14:creationId xmlns:p14="http://schemas.microsoft.com/office/powerpoint/2010/main" val="4036789125"/>
       </p:ext>
     </p:extLst>
   </p:cSld>
@@ -3909,11 +3856,7 @@
           <a:p>
             <a:r>
               <a:rPr lang="pt-BR" dirty="0" smtClean="0"/>
-              <a:t>TODO </a:t>
-            </a:r>
-            <a:r>
-              <a:rPr lang="pt-BR" dirty="0" err="1" smtClean="0"/>
-              <a:t>App</a:t>
+              <a:t>DEMO</a:t>
             </a:r>
             <a:endParaRPr lang="pt-BR" dirty="0"/>
           </a:p>
@@ -3921,12 +3864,12 @@
       </p:sp>
       <p:sp>
         <p:nvSpPr>
-          <p:cNvPr id="3" name="Espaço Reservado para Conteúdo 2"/>
-          <p:cNvSpPr>
-            <a:spLocks noGrp="1"/>
-          </p:cNvSpPr>
-          <p:nvPr>
-            <p:ph idx="1"/>
+          <p:cNvPr id="5" name="Espaço Reservado para Conteúdo 4"/>
+          <p:cNvSpPr>
+            <a:spLocks noGrp="1"/>
+          </p:cNvSpPr>
+          <p:nvPr>
+            <p:ph type="body" idx="1"/>
           </p:nvPr>
         </p:nvSpPr>
         <p:spPr/>
@@ -3936,27 +3879,23 @@
           </a:bodyPr>
           <a:lstStyle/>
           <a:p>
-            <a:pPr fontAlgn="base"/>
-            <a:r>
-              <a:rPr lang="pt-BR" dirty="0" smtClean="0"/>
-              <a:t>Criando </a:t>
-            </a:r>
-            <a:r>
-              <a:rPr lang="pt-BR" dirty="0"/>
-              <a:t>sua primeira aplicação com </a:t>
-            </a:r>
-            <a:r>
-              <a:rPr lang="pt-BR" dirty="0" err="1"/>
-              <a:t>angularjs</a:t>
-            </a:r>
-            <a:endParaRPr lang="pt-BR" dirty="0"/>
+            <a:pPr lvl="1" fontAlgn="base"/>
+            <a:r>
+              <a:rPr lang="pt-BR" dirty="0" smtClean="0"/>
+              <a:t>Trabalhando </a:t>
+            </a:r>
+            <a:r>
+              <a:rPr lang="pt-BR" smtClean="0"/>
+              <a:t>com dados</a:t>
+            </a:r>
+            <a:endParaRPr lang="pt-BR" dirty="0" smtClean="0"/>
           </a:p>
         </p:txBody>
       </p:sp>
     </p:spTree>
     <p:extLst>
       <p:ext uri="{BB962C8B-B14F-4D97-AF65-F5344CB8AC3E}">
-        <p14:creationId xmlns:p14="http://schemas.microsoft.com/office/powerpoint/2010/main" val="1298799534"/>
+        <p14:creationId xmlns:p14="http://schemas.microsoft.com/office/powerpoint/2010/main" val="2066406534"/>
       </p:ext>
     </p:extLst>
   </p:cSld>
@@ -4022,18 +3961,9 @@
           <a:bodyPr/>
           <a:lstStyle/>
           <a:p>
-            <a:pPr fontAlgn="base"/>
-            <a:r>
-              <a:rPr lang="pt-BR" dirty="0" smtClean="0"/>
-              <a:t>Módulos </a:t>
-            </a:r>
-            <a:r>
-              <a:rPr lang="pt-BR" dirty="0"/>
-              <a:t>e </a:t>
-            </a:r>
-            <a:r>
-              <a:rPr lang="pt-BR" dirty="0" smtClean="0"/>
-              <a:t>Dependências</a:t>
+            <a:r>
+              <a:rPr lang="pt-BR" dirty="0" smtClean="0"/>
+              <a:t>Outros</a:t>
             </a:r>
             <a:endParaRPr lang="pt-BR" dirty="0"/>
           </a:p>
@@ -4041,51 +3971,40 @@
       </p:sp>
       <p:sp>
         <p:nvSpPr>
-          <p:cNvPr id="3" name="Espaço Reservado para Conteúdo 2"/>
-          <p:cNvSpPr>
-            <a:spLocks noGrp="1"/>
-          </p:cNvSpPr>
-          <p:nvPr>
-            <p:ph idx="1"/>
-          </p:nvPr>
-        </p:nvSpPr>
-        <p:spPr/>
-        <p:txBody>
-          <a:bodyPr numCol="1">
-            <a:normAutofit/>
-          </a:bodyPr>
-          <a:lstStyle/>
-          <a:p>
-            <a:pPr fontAlgn="base"/>
-            <a:r>
-              <a:rPr lang="pt-BR" dirty="0" smtClean="0"/>
-              <a:t>Por </a:t>
-            </a:r>
-            <a:r>
-              <a:rPr lang="pt-BR" dirty="0"/>
-              <a:t>que modularizar?</a:t>
-            </a:r>
-          </a:p>
-          <a:p>
-            <a:pPr fontAlgn="base"/>
-            <a:r>
-              <a:rPr lang="pt-BR" dirty="0"/>
-              <a:t>Criando módulos</a:t>
-            </a:r>
-          </a:p>
-          <a:p>
-            <a:pPr fontAlgn="base"/>
-            <a:r>
-              <a:rPr lang="pt-BR" dirty="0"/>
-              <a:t>Injetando dependências</a:t>
-            </a:r>
+          <p:cNvPr id="4" name="Espaço Reservado para Texto 3"/>
+          <p:cNvSpPr>
+            <a:spLocks noGrp="1"/>
+          </p:cNvSpPr>
+          <p:nvPr>
+            <p:ph type="body" idx="1"/>
+          </p:nvPr>
+        </p:nvSpPr>
+        <p:spPr/>
+        <p:txBody>
+          <a:bodyPr/>
+          <a:lstStyle/>
+          <a:p>
+            <a:pPr marL="0" lvl="1">
+              <a:spcBef>
+                <a:spcPts val="1000"/>
+              </a:spcBef>
+            </a:pPr>
+            <a:r>
+              <a:rPr lang="pt-BR" dirty="0" smtClean="0"/>
+              <a:t>Módulo 4 – Aula </a:t>
+            </a:r>
+            <a:r>
+              <a:rPr lang="pt-BR" dirty="0" smtClean="0"/>
+              <a:t>5</a:t>
+            </a:r>
+            <a:endParaRPr lang="pt-BR" dirty="0" smtClean="0"/>
           </a:p>
         </p:txBody>
       </p:sp>
     </p:spTree>
     <p:extLst>
       <p:ext uri="{BB962C8B-B14F-4D97-AF65-F5344CB8AC3E}">
-        <p14:creationId xmlns:p14="http://schemas.microsoft.com/office/powerpoint/2010/main" val="2063121660"/>
+        <p14:creationId xmlns:p14="http://schemas.microsoft.com/office/powerpoint/2010/main" val="2217084439"/>
       </p:ext>
     </p:extLst>
   </p:cSld>
@@ -4151,10 +4070,9 @@
           <a:bodyPr/>
           <a:lstStyle/>
           <a:p>
-            <a:pPr fontAlgn="base"/>
-            <a:r>
-              <a:rPr lang="pt-BR" dirty="0" smtClean="0"/>
-              <a:t>Rotas</a:t>
+            <a:r>
+              <a:rPr lang="pt-BR" dirty="0" smtClean="0"/>
+              <a:t>Outros</a:t>
             </a:r>
             <a:endParaRPr lang="pt-BR" dirty="0"/>
           </a:p>
@@ -4177,34 +4095,62 @@
           </a:bodyPr>
           <a:lstStyle/>
           <a:p>
-            <a:pPr fontAlgn="base"/>
-            <a:r>
-              <a:rPr lang="pt-BR" dirty="0" smtClean="0"/>
-              <a:t>Trabalhando </a:t>
+            <a:pPr marL="228600" lvl="1" fontAlgn="base">
+              <a:spcBef>
+                <a:spcPts val="1000"/>
+              </a:spcBef>
+            </a:pPr>
+            <a:r>
+              <a:rPr lang="pt-BR" dirty="0" smtClean="0"/>
+              <a:t>Funções </a:t>
             </a:r>
             <a:r>
               <a:rPr lang="pt-BR" dirty="0"/>
-              <a:t>com rotas</a:t>
-            </a:r>
-          </a:p>
-          <a:p>
-            <a:pPr fontAlgn="base"/>
+              <a:t>computadas</a:t>
+            </a:r>
+          </a:p>
+          <a:p>
+            <a:pPr marL="228600" lvl="1" fontAlgn="base">
+              <a:spcBef>
+                <a:spcPts val="1000"/>
+              </a:spcBef>
+            </a:pPr>
             <a:r>
               <a:rPr lang="pt-BR" dirty="0" err="1"/>
-              <a:t>Views</a:t>
+              <a:t>Ng</a:t>
             </a:r>
             <a:r>
               <a:rPr lang="pt-BR" dirty="0"/>
-              <a:t>, rotas e </a:t>
+              <a:t>-show e </a:t>
             </a:r>
             <a:r>
               <a:rPr lang="pt-BR" dirty="0" err="1"/>
-              <a:t>controllers</a:t>
+              <a:t>ng-hide</a:t>
             </a:r>
             <a:endParaRPr lang="pt-BR" dirty="0"/>
           </a:p>
           <a:p>
-            <a:pPr fontAlgn="base"/>
+            <a:pPr marL="228600" lvl="1" fontAlgn="base">
+              <a:spcBef>
+                <a:spcPts val="1000"/>
+              </a:spcBef>
+            </a:pPr>
+            <a:r>
+              <a:rPr lang="pt-BR" dirty="0" err="1"/>
+              <a:t>Ng-if</a:t>
+            </a:r>
+            <a:endParaRPr lang="pt-BR" dirty="0"/>
+          </a:p>
+          <a:p>
+            <a:pPr marL="228600" lvl="1" fontAlgn="base">
+              <a:spcBef>
+                <a:spcPts val="1000"/>
+              </a:spcBef>
+            </a:pPr>
+            <a:r>
+              <a:rPr lang="pt-BR" dirty="0" err="1"/>
+              <a:t>Ng-class</a:t>
+            </a:r>
             <a:endParaRPr lang="pt-BR" dirty="0"/>
           </a:p>
         </p:txBody>
@@ -4212,7 +4158,7 @@
     </p:spTree>
     <p:extLst>
       <p:ext uri="{BB962C8B-B14F-4D97-AF65-F5344CB8AC3E}">
-        <p14:creationId xmlns:p14="http://schemas.microsoft.com/office/powerpoint/2010/main" val="1816641699"/>
+        <p14:creationId xmlns:p14="http://schemas.microsoft.com/office/powerpoint/2010/main" val="857922641"/>
       </p:ext>
     </p:extLst>
   </p:cSld>
@@ -4278,10 +4224,9 @@
           <a:bodyPr/>
           <a:lstStyle/>
           <a:p>
-            <a:pPr fontAlgn="base"/>
-            <a:r>
-              <a:rPr lang="pt-BR" dirty="0" smtClean="0"/>
-              <a:t>Estruturando a Aplicação</a:t>
+            <a:r>
+              <a:rPr lang="pt-BR" dirty="0" smtClean="0"/>
+              <a:t>DEMO</a:t>
             </a:r>
             <a:endParaRPr lang="pt-BR" dirty="0"/>
           </a:p>
@@ -4289,12 +4234,12 @@
       </p:sp>
       <p:sp>
         <p:nvSpPr>
-          <p:cNvPr id="3" name="Espaço Reservado para Conteúdo 2"/>
-          <p:cNvSpPr>
-            <a:spLocks noGrp="1"/>
-          </p:cNvSpPr>
-          <p:nvPr>
-            <p:ph idx="1"/>
+          <p:cNvPr id="5" name="Espaço Reservado para Conteúdo 4"/>
+          <p:cNvSpPr>
+            <a:spLocks noGrp="1"/>
+          </p:cNvSpPr>
+          <p:nvPr>
+            <p:ph type="body" idx="1"/>
           </p:nvPr>
         </p:nvSpPr>
         <p:spPr/>
@@ -4304,40 +4249,19 @@
           </a:bodyPr>
           <a:lstStyle/>
           <a:p>
-            <a:pPr fontAlgn="base"/>
-            <a:r>
-              <a:rPr lang="pt-BR" dirty="0" smtClean="0"/>
-              <a:t>Estrutura </a:t>
-            </a:r>
-            <a:r>
-              <a:rPr lang="pt-BR" dirty="0"/>
-              <a:t>por tipos</a:t>
-            </a:r>
-          </a:p>
-          <a:p>
-            <a:pPr fontAlgn="base"/>
-            <a:r>
-              <a:rPr lang="pt-BR" dirty="0"/>
-              <a:t>Estrutura por módulos</a:t>
-            </a:r>
-          </a:p>
-          <a:p>
-            <a:pPr fontAlgn="base"/>
-            <a:r>
-              <a:rPr lang="pt-BR" dirty="0"/>
-              <a:t>Estrutura por componentes</a:t>
-            </a:r>
-          </a:p>
-          <a:p>
-            <a:pPr fontAlgn="base"/>
-            <a:endParaRPr lang="pt-BR" dirty="0"/>
+            <a:pPr lvl="1" fontAlgn="base"/>
+            <a:r>
+              <a:rPr lang="pt-BR" dirty="0" smtClean="0"/>
+              <a:t>Outros pontos</a:t>
+            </a:r>
+            <a:endParaRPr lang="pt-BR" dirty="0" smtClean="0"/>
           </a:p>
         </p:txBody>
       </p:sp>
     </p:spTree>
     <p:extLst>
       <p:ext uri="{BB962C8B-B14F-4D97-AF65-F5344CB8AC3E}">
-        <p14:creationId xmlns:p14="http://schemas.microsoft.com/office/powerpoint/2010/main" val="382626703"/>
+        <p14:creationId xmlns:p14="http://schemas.microsoft.com/office/powerpoint/2010/main" val="4150010635"/>
       </p:ext>
     </p:extLst>
   </p:cSld>
@@ -4596,10 +4520,13 @@
           <a:bodyPr/>
           <a:lstStyle/>
           <a:p>
-            <a:pPr fontAlgn="base"/>
-            <a:r>
-              <a:rPr lang="pt-BR" dirty="0" smtClean="0"/>
-              <a:t>CRUD</a:t>
+            <a:r>
+              <a:rPr lang="pt-BR" dirty="0" smtClean="0"/>
+              <a:t>TODO </a:t>
+            </a:r>
+            <a:r>
+              <a:rPr lang="pt-BR" dirty="0" err="1" smtClean="0"/>
+              <a:t>App</a:t>
             </a:r>
             <a:endParaRPr lang="pt-BR" dirty="0"/>
           </a:p>
@@ -4607,42 +4534,40 @@
       </p:sp>
       <p:sp>
         <p:nvSpPr>
-          <p:cNvPr id="3" name="Espaço Reservado para Conteúdo 2"/>
-          <p:cNvSpPr>
-            <a:spLocks noGrp="1"/>
-          </p:cNvSpPr>
-          <p:nvPr>
-            <p:ph idx="1"/>
-          </p:nvPr>
-        </p:nvSpPr>
-        <p:spPr/>
-        <p:txBody>
-          <a:bodyPr numCol="1">
-            <a:normAutofit/>
-          </a:bodyPr>
-          <a:lstStyle/>
-          <a:p>
-            <a:pPr fontAlgn="base"/>
-            <a:r>
-              <a:rPr lang="pt-BR" dirty="0" smtClean="0"/>
-              <a:t>Criando </a:t>
+          <p:cNvPr id="4" name="Espaço Reservado para Texto 3"/>
+          <p:cNvSpPr>
+            <a:spLocks noGrp="1"/>
+          </p:cNvSpPr>
+          <p:nvPr>
+            <p:ph type="body" idx="1"/>
+          </p:nvPr>
+        </p:nvSpPr>
+        <p:spPr/>
+        <p:txBody>
+          <a:bodyPr/>
+          <a:lstStyle/>
+          <a:p>
+            <a:pPr marL="0" lvl="1">
+              <a:spcBef>
+                <a:spcPts val="1000"/>
+              </a:spcBef>
+            </a:pPr>
+            <a:r>
+              <a:rPr lang="pt-BR" dirty="0" smtClean="0"/>
+              <a:t>Módulo 4 – Aula </a:t>
             </a:r>
             <a:r>
               <a:rPr lang="pt-BR" dirty="0"/>
-              <a:t>uma aplicação com </a:t>
-            </a:r>
-            <a:r>
-              <a:rPr lang="pt-BR" dirty="0" err="1"/>
-              <a:t>crud</a:t>
-            </a:r>
-            <a:endParaRPr lang="pt-BR" dirty="0"/>
+              <a:t>6</a:t>
+            </a:r>
+            <a:endParaRPr lang="pt-BR" dirty="0" smtClean="0"/>
           </a:p>
         </p:txBody>
       </p:sp>
     </p:spTree>
     <p:extLst>
       <p:ext uri="{BB962C8B-B14F-4D97-AF65-F5344CB8AC3E}">
-        <p14:creationId xmlns:p14="http://schemas.microsoft.com/office/powerpoint/2010/main" val="1221025183"/>
+        <p14:creationId xmlns:p14="http://schemas.microsoft.com/office/powerpoint/2010/main" val="94013407"/>
       </p:ext>
     </p:extLst>
   </p:cSld>
@@ -4708,10 +4633,9 @@
           <a:bodyPr/>
           <a:lstStyle/>
           <a:p>
-            <a:pPr fontAlgn="base"/>
-            <a:r>
-              <a:rPr lang="pt-BR" dirty="0" smtClean="0"/>
-              <a:t>CRUD</a:t>
+            <a:r>
+              <a:rPr lang="pt-BR" dirty="0" smtClean="0"/>
+              <a:t>DEMO</a:t>
             </a:r>
             <a:endParaRPr lang="pt-BR" dirty="0"/>
           </a:p>
@@ -4719,12 +4643,12 @@
       </p:sp>
       <p:sp>
         <p:nvSpPr>
-          <p:cNvPr id="3" name="Espaço Reservado para Conteúdo 2"/>
-          <p:cNvSpPr>
-            <a:spLocks noGrp="1"/>
-          </p:cNvSpPr>
-          <p:nvPr>
-            <p:ph idx="1"/>
+          <p:cNvPr id="5" name="Espaço Reservado para Conteúdo 4"/>
+          <p:cNvSpPr>
+            <a:spLocks noGrp="1"/>
+          </p:cNvSpPr>
+          <p:nvPr>
+            <p:ph type="body" idx="1"/>
           </p:nvPr>
         </p:nvSpPr>
         <p:spPr/>
@@ -4734,27 +4658,953 @@
           </a:bodyPr>
           <a:lstStyle/>
           <a:p>
-            <a:pPr fontAlgn="base"/>
-            <a:r>
-              <a:rPr lang="pt-BR" dirty="0" smtClean="0"/>
-              <a:t>Criando </a:t>
-            </a:r>
-            <a:r>
-              <a:rPr lang="pt-BR" dirty="0"/>
-              <a:t>uma aplicação com </a:t>
-            </a:r>
-            <a:r>
-              <a:rPr lang="pt-BR" dirty="0" err="1"/>
-              <a:t>crud</a:t>
-            </a:r>
-            <a:endParaRPr lang="pt-BR" dirty="0"/>
+            <a:pPr lvl="1" fontAlgn="base"/>
+            <a:r>
+              <a:rPr lang="pt-BR" dirty="0" smtClean="0"/>
+              <a:t>Criando um TODO APP</a:t>
+            </a:r>
+            <a:endParaRPr lang="pt-BR" dirty="0" smtClean="0"/>
           </a:p>
         </p:txBody>
       </p:sp>
     </p:spTree>
     <p:extLst>
       <p:ext uri="{BB962C8B-B14F-4D97-AF65-F5344CB8AC3E}">
-        <p14:creationId xmlns:p14="http://schemas.microsoft.com/office/powerpoint/2010/main" val="2425644799"/>
+        <p14:creationId xmlns:p14="http://schemas.microsoft.com/office/powerpoint/2010/main" val="1122138139"/>
+      </p:ext>
+    </p:extLst>
+  </p:cSld>
+  <p:clrMapOvr>
+    <a:masterClrMapping/>
+  </p:clrMapOvr>
+  <p:transition xmlns:p14="http://schemas.microsoft.com/office/powerpoint/2010/main" spd="slow">
+    <p:push dir="u"/>
+  </p:transition>
+  <p:timing>
+    <p:tnLst>
+      <p:par>
+        <p:cTn xmlns:p14="http://schemas.microsoft.com/office/powerpoint/2010/main" id="1" dur="indefinite" restart="never" nodeType="tmRoot"/>
+      </p:par>
+    </p:tnLst>
+  </p:timing>
+</p:sld>
+</file>
+
+<file path=ppt/slides/slide22.xml><?xml version="1.0" encoding="utf-8"?>
+<p:sld xmlns:a="http://schemas.openxmlformats.org/drawingml/2006/main" xmlns:r="http://schemas.openxmlformats.org/officeDocument/2006/relationships" xmlns:p="http://schemas.openxmlformats.org/presentationml/2006/main">
+  <p:cSld>
+    <p:bg>
+      <p:bgPr>
+        <a:blipFill dpi="0" rotWithShape="1">
+          <a:blip r:embed="rId2">
+            <a:lum/>
+          </a:blip>
+          <a:srcRect/>
+          <a:stretch>
+            <a:fillRect/>
+          </a:stretch>
+        </a:blipFill>
+        <a:effectLst/>
+      </p:bgPr>
+    </p:bg>
+    <p:spTree>
+      <p:nvGrpSpPr>
+        <p:cNvPr id="1" name=""/>
+        <p:cNvGrpSpPr/>
+        <p:nvPr/>
+      </p:nvGrpSpPr>
+      <p:grpSpPr>
+        <a:xfrm>
+          <a:off x="0" y="0"/>
+          <a:ext cx="0" cy="0"/>
+          <a:chOff x="0" y="0"/>
+          <a:chExt cx="0" cy="0"/>
+        </a:xfrm>
+      </p:grpSpPr>
+      <p:sp>
+        <p:nvSpPr>
+          <p:cNvPr id="2" name="Título 1"/>
+          <p:cNvSpPr>
+            <a:spLocks noGrp="1"/>
+          </p:cNvSpPr>
+          <p:nvPr>
+            <p:ph type="title"/>
+          </p:nvPr>
+        </p:nvSpPr>
+        <p:spPr/>
+        <p:txBody>
+          <a:bodyPr/>
+          <a:lstStyle/>
+          <a:p>
+            <a:r>
+              <a:rPr lang="pt-BR" dirty="0" smtClean="0"/>
+              <a:t>M</a:t>
+            </a:r>
+            <a:r>
+              <a:rPr lang="pt-BR" dirty="0" smtClean="0"/>
+              <a:t>ódulos e Dependências</a:t>
+            </a:r>
+            <a:endParaRPr lang="pt-BR" dirty="0"/>
+          </a:p>
+        </p:txBody>
+      </p:sp>
+      <p:sp>
+        <p:nvSpPr>
+          <p:cNvPr id="4" name="Espaço Reservado para Texto 3"/>
+          <p:cNvSpPr>
+            <a:spLocks noGrp="1"/>
+          </p:cNvSpPr>
+          <p:nvPr>
+            <p:ph type="body" idx="1"/>
+          </p:nvPr>
+        </p:nvSpPr>
+        <p:spPr/>
+        <p:txBody>
+          <a:bodyPr/>
+          <a:lstStyle/>
+          <a:p>
+            <a:pPr marL="0" lvl="1">
+              <a:spcBef>
+                <a:spcPts val="1000"/>
+              </a:spcBef>
+            </a:pPr>
+            <a:r>
+              <a:rPr lang="pt-BR" dirty="0" smtClean="0"/>
+              <a:t>Módulo 4 – Aula </a:t>
+            </a:r>
+            <a:r>
+              <a:rPr lang="pt-BR" dirty="0" smtClean="0"/>
+              <a:t>7</a:t>
+            </a:r>
+            <a:endParaRPr lang="pt-BR" dirty="0" smtClean="0"/>
+          </a:p>
+        </p:txBody>
+      </p:sp>
+    </p:spTree>
+    <p:extLst>
+      <p:ext uri="{BB962C8B-B14F-4D97-AF65-F5344CB8AC3E}">
+        <p14:creationId xmlns:p14="http://schemas.microsoft.com/office/powerpoint/2010/main" val="1226632637"/>
+      </p:ext>
+    </p:extLst>
+  </p:cSld>
+  <p:clrMapOvr>
+    <a:masterClrMapping/>
+  </p:clrMapOvr>
+  <p:transition xmlns:p14="http://schemas.microsoft.com/office/powerpoint/2010/main" spd="slow">
+    <p:push dir="u"/>
+  </p:transition>
+  <p:timing>
+    <p:tnLst>
+      <p:par>
+        <p:cTn xmlns:p14="http://schemas.microsoft.com/office/powerpoint/2010/main" id="1" dur="indefinite" restart="never" nodeType="tmRoot"/>
+      </p:par>
+    </p:tnLst>
+  </p:timing>
+</p:sld>
+</file>
+
+<file path=ppt/slides/slide23.xml><?xml version="1.0" encoding="utf-8"?>
+<p:sld xmlns:a="http://schemas.openxmlformats.org/drawingml/2006/main" xmlns:r="http://schemas.openxmlformats.org/officeDocument/2006/relationships" xmlns:p="http://schemas.openxmlformats.org/presentationml/2006/main">
+  <p:cSld>
+    <p:bg>
+      <p:bgPr>
+        <a:blipFill dpi="0" rotWithShape="1">
+          <a:blip r:embed="rId2">
+            <a:lum/>
+          </a:blip>
+          <a:srcRect/>
+          <a:stretch>
+            <a:fillRect/>
+          </a:stretch>
+        </a:blipFill>
+        <a:effectLst/>
+      </p:bgPr>
+    </p:bg>
+    <p:spTree>
+      <p:nvGrpSpPr>
+        <p:cNvPr id="1" name=""/>
+        <p:cNvGrpSpPr/>
+        <p:nvPr/>
+      </p:nvGrpSpPr>
+      <p:grpSpPr>
+        <a:xfrm>
+          <a:off x="0" y="0"/>
+          <a:ext cx="0" cy="0"/>
+          <a:chOff x="0" y="0"/>
+          <a:chExt cx="0" cy="0"/>
+        </a:xfrm>
+      </p:grpSpPr>
+      <p:sp>
+        <p:nvSpPr>
+          <p:cNvPr id="2" name="Título 1"/>
+          <p:cNvSpPr>
+            <a:spLocks noGrp="1"/>
+          </p:cNvSpPr>
+          <p:nvPr>
+            <p:ph type="title"/>
+          </p:nvPr>
+        </p:nvSpPr>
+        <p:spPr/>
+        <p:txBody>
+          <a:bodyPr/>
+          <a:lstStyle/>
+          <a:p>
+            <a:pPr fontAlgn="base"/>
+            <a:r>
+              <a:rPr lang="pt-BR" dirty="0" smtClean="0"/>
+              <a:t>Módulos </a:t>
+            </a:r>
+            <a:r>
+              <a:rPr lang="pt-BR" dirty="0"/>
+              <a:t>e </a:t>
+            </a:r>
+            <a:r>
+              <a:rPr lang="pt-BR" dirty="0" smtClean="0"/>
+              <a:t>Dependências</a:t>
+            </a:r>
+            <a:endParaRPr lang="pt-BR" dirty="0"/>
+          </a:p>
+        </p:txBody>
+      </p:sp>
+      <p:sp>
+        <p:nvSpPr>
+          <p:cNvPr id="3" name="Espaço Reservado para Conteúdo 2"/>
+          <p:cNvSpPr>
+            <a:spLocks noGrp="1"/>
+          </p:cNvSpPr>
+          <p:nvPr>
+            <p:ph idx="1"/>
+          </p:nvPr>
+        </p:nvSpPr>
+        <p:spPr/>
+        <p:txBody>
+          <a:bodyPr numCol="1">
+            <a:normAutofit/>
+          </a:bodyPr>
+          <a:lstStyle/>
+          <a:p>
+            <a:pPr fontAlgn="base"/>
+            <a:r>
+              <a:rPr lang="pt-BR" dirty="0" smtClean="0"/>
+              <a:t>Por </a:t>
+            </a:r>
+            <a:r>
+              <a:rPr lang="pt-BR" dirty="0"/>
+              <a:t>que modularizar?</a:t>
+            </a:r>
+          </a:p>
+          <a:p>
+            <a:pPr fontAlgn="base"/>
+            <a:r>
+              <a:rPr lang="pt-BR" dirty="0"/>
+              <a:t>Criando módulos</a:t>
+            </a:r>
+          </a:p>
+          <a:p>
+            <a:pPr fontAlgn="base"/>
+            <a:r>
+              <a:rPr lang="pt-BR" dirty="0"/>
+              <a:t>Injetando dependências</a:t>
+            </a:r>
+          </a:p>
+        </p:txBody>
+      </p:sp>
+    </p:spTree>
+    <p:extLst>
+      <p:ext uri="{BB962C8B-B14F-4D97-AF65-F5344CB8AC3E}">
+        <p14:creationId xmlns:p14="http://schemas.microsoft.com/office/powerpoint/2010/main" val="2063121660"/>
+      </p:ext>
+    </p:extLst>
+  </p:cSld>
+  <p:clrMapOvr>
+    <a:masterClrMapping/>
+  </p:clrMapOvr>
+  <p:transition xmlns:p14="http://schemas.microsoft.com/office/powerpoint/2010/main" spd="slow">
+    <p:push dir="u"/>
+  </p:transition>
+  <p:timing>
+    <p:tnLst>
+      <p:par>
+        <p:cTn xmlns:p14="http://schemas.microsoft.com/office/powerpoint/2010/main" id="1" dur="indefinite" restart="never" nodeType="tmRoot"/>
+      </p:par>
+    </p:tnLst>
+  </p:timing>
+</p:sld>
+</file>
+
+<file path=ppt/slides/slide24.xml><?xml version="1.0" encoding="utf-8"?>
+<p:sld xmlns:a="http://schemas.openxmlformats.org/drawingml/2006/main" xmlns:r="http://schemas.openxmlformats.org/officeDocument/2006/relationships" xmlns:p="http://schemas.openxmlformats.org/presentationml/2006/main">
+  <p:cSld>
+    <p:bg>
+      <p:bgPr>
+        <a:blipFill dpi="0" rotWithShape="1">
+          <a:blip r:embed="rId2">
+            <a:lum/>
+          </a:blip>
+          <a:srcRect/>
+          <a:stretch>
+            <a:fillRect/>
+          </a:stretch>
+        </a:blipFill>
+        <a:effectLst/>
+      </p:bgPr>
+    </p:bg>
+    <p:spTree>
+      <p:nvGrpSpPr>
+        <p:cNvPr id="1" name=""/>
+        <p:cNvGrpSpPr/>
+        <p:nvPr/>
+      </p:nvGrpSpPr>
+      <p:grpSpPr>
+        <a:xfrm>
+          <a:off x="0" y="0"/>
+          <a:ext cx="0" cy="0"/>
+          <a:chOff x="0" y="0"/>
+          <a:chExt cx="0" cy="0"/>
+        </a:xfrm>
+      </p:grpSpPr>
+      <p:sp>
+        <p:nvSpPr>
+          <p:cNvPr id="2" name="Título 1"/>
+          <p:cNvSpPr>
+            <a:spLocks noGrp="1"/>
+          </p:cNvSpPr>
+          <p:nvPr>
+            <p:ph type="title"/>
+          </p:nvPr>
+        </p:nvSpPr>
+        <p:spPr/>
+        <p:txBody>
+          <a:bodyPr/>
+          <a:lstStyle/>
+          <a:p>
+            <a:r>
+              <a:rPr lang="pt-BR" dirty="0" smtClean="0"/>
+              <a:t>DEMO</a:t>
+            </a:r>
+            <a:endParaRPr lang="pt-BR" dirty="0"/>
+          </a:p>
+        </p:txBody>
+      </p:sp>
+      <p:sp>
+        <p:nvSpPr>
+          <p:cNvPr id="5" name="Espaço Reservado para Conteúdo 4"/>
+          <p:cNvSpPr>
+            <a:spLocks noGrp="1"/>
+          </p:cNvSpPr>
+          <p:nvPr>
+            <p:ph type="body" idx="1"/>
+          </p:nvPr>
+        </p:nvSpPr>
+        <p:spPr/>
+        <p:txBody>
+          <a:bodyPr numCol="1">
+            <a:normAutofit/>
+          </a:bodyPr>
+          <a:lstStyle/>
+          <a:p>
+            <a:pPr lvl="1" fontAlgn="base"/>
+            <a:r>
+              <a:rPr lang="pt-BR" dirty="0" smtClean="0"/>
+              <a:t>Criando m</a:t>
+            </a:r>
+            <a:r>
+              <a:rPr lang="pt-BR" dirty="0" smtClean="0"/>
+              <a:t>ódulos e dependências</a:t>
+            </a:r>
+            <a:endParaRPr lang="pt-BR" dirty="0" smtClean="0"/>
+          </a:p>
+        </p:txBody>
+      </p:sp>
+    </p:spTree>
+    <p:extLst>
+      <p:ext uri="{BB962C8B-B14F-4D97-AF65-F5344CB8AC3E}">
+        <p14:creationId xmlns:p14="http://schemas.microsoft.com/office/powerpoint/2010/main" val="460047180"/>
+      </p:ext>
+    </p:extLst>
+  </p:cSld>
+  <p:clrMapOvr>
+    <a:masterClrMapping/>
+  </p:clrMapOvr>
+  <p:transition xmlns:p14="http://schemas.microsoft.com/office/powerpoint/2010/main" spd="slow">
+    <p:push dir="u"/>
+  </p:transition>
+  <p:timing>
+    <p:tnLst>
+      <p:par>
+        <p:cTn xmlns:p14="http://schemas.microsoft.com/office/powerpoint/2010/main" id="1" dur="indefinite" restart="never" nodeType="tmRoot"/>
+      </p:par>
+    </p:tnLst>
+  </p:timing>
+</p:sld>
+</file>
+
+<file path=ppt/slides/slide25.xml><?xml version="1.0" encoding="utf-8"?>
+<p:sld xmlns:a="http://schemas.openxmlformats.org/drawingml/2006/main" xmlns:r="http://schemas.openxmlformats.org/officeDocument/2006/relationships" xmlns:p="http://schemas.openxmlformats.org/presentationml/2006/main">
+  <p:cSld>
+    <p:bg>
+      <p:bgPr>
+        <a:blipFill dpi="0" rotWithShape="1">
+          <a:blip r:embed="rId2">
+            <a:lum/>
+          </a:blip>
+          <a:srcRect/>
+          <a:stretch>
+            <a:fillRect/>
+          </a:stretch>
+        </a:blipFill>
+        <a:effectLst/>
+      </p:bgPr>
+    </p:bg>
+    <p:spTree>
+      <p:nvGrpSpPr>
+        <p:cNvPr id="1" name=""/>
+        <p:cNvGrpSpPr/>
+        <p:nvPr/>
+      </p:nvGrpSpPr>
+      <p:grpSpPr>
+        <a:xfrm>
+          <a:off x="0" y="0"/>
+          <a:ext cx="0" cy="0"/>
+          <a:chOff x="0" y="0"/>
+          <a:chExt cx="0" cy="0"/>
+        </a:xfrm>
+      </p:grpSpPr>
+      <p:sp>
+        <p:nvSpPr>
+          <p:cNvPr id="2" name="Título 1"/>
+          <p:cNvSpPr>
+            <a:spLocks noGrp="1"/>
+          </p:cNvSpPr>
+          <p:nvPr>
+            <p:ph type="title"/>
+          </p:nvPr>
+        </p:nvSpPr>
+        <p:spPr/>
+        <p:txBody>
+          <a:bodyPr/>
+          <a:lstStyle/>
+          <a:p>
+            <a:r>
+              <a:rPr lang="pt-BR" dirty="0" smtClean="0"/>
+              <a:t>Rotas</a:t>
+            </a:r>
+            <a:endParaRPr lang="pt-BR" dirty="0"/>
+          </a:p>
+        </p:txBody>
+      </p:sp>
+      <p:sp>
+        <p:nvSpPr>
+          <p:cNvPr id="4" name="Espaço Reservado para Texto 3"/>
+          <p:cNvSpPr>
+            <a:spLocks noGrp="1"/>
+          </p:cNvSpPr>
+          <p:nvPr>
+            <p:ph type="body" idx="1"/>
+          </p:nvPr>
+        </p:nvSpPr>
+        <p:spPr/>
+        <p:txBody>
+          <a:bodyPr/>
+          <a:lstStyle/>
+          <a:p>
+            <a:pPr marL="0" lvl="1">
+              <a:spcBef>
+                <a:spcPts val="1000"/>
+              </a:spcBef>
+            </a:pPr>
+            <a:r>
+              <a:rPr lang="pt-BR" dirty="0" smtClean="0"/>
+              <a:t>Módulo 4 – Aula </a:t>
+            </a:r>
+            <a:r>
+              <a:rPr lang="pt-BR" dirty="0"/>
+              <a:t>8</a:t>
+            </a:r>
+            <a:endParaRPr lang="pt-BR" dirty="0" smtClean="0"/>
+          </a:p>
+        </p:txBody>
+      </p:sp>
+    </p:spTree>
+    <p:extLst>
+      <p:ext uri="{BB962C8B-B14F-4D97-AF65-F5344CB8AC3E}">
+        <p14:creationId xmlns:p14="http://schemas.microsoft.com/office/powerpoint/2010/main" val="3357108507"/>
+      </p:ext>
+    </p:extLst>
+  </p:cSld>
+  <p:clrMapOvr>
+    <a:masterClrMapping/>
+  </p:clrMapOvr>
+  <p:transition xmlns:p14="http://schemas.microsoft.com/office/powerpoint/2010/main" spd="slow">
+    <p:push dir="u"/>
+  </p:transition>
+  <p:timing>
+    <p:tnLst>
+      <p:par>
+        <p:cTn xmlns:p14="http://schemas.microsoft.com/office/powerpoint/2010/main" id="1" dur="indefinite" restart="never" nodeType="tmRoot"/>
+      </p:par>
+    </p:tnLst>
+  </p:timing>
+</p:sld>
+</file>
+
+<file path=ppt/slides/slide26.xml><?xml version="1.0" encoding="utf-8"?>
+<p:sld xmlns:a="http://schemas.openxmlformats.org/drawingml/2006/main" xmlns:r="http://schemas.openxmlformats.org/officeDocument/2006/relationships" xmlns:p="http://schemas.openxmlformats.org/presentationml/2006/main">
+  <p:cSld>
+    <p:bg>
+      <p:bgPr>
+        <a:blipFill dpi="0" rotWithShape="1">
+          <a:blip r:embed="rId2">
+            <a:lum/>
+          </a:blip>
+          <a:srcRect/>
+          <a:stretch>
+            <a:fillRect/>
+          </a:stretch>
+        </a:blipFill>
+        <a:effectLst/>
+      </p:bgPr>
+    </p:bg>
+    <p:spTree>
+      <p:nvGrpSpPr>
+        <p:cNvPr id="1" name=""/>
+        <p:cNvGrpSpPr/>
+        <p:nvPr/>
+      </p:nvGrpSpPr>
+      <p:grpSpPr>
+        <a:xfrm>
+          <a:off x="0" y="0"/>
+          <a:ext cx="0" cy="0"/>
+          <a:chOff x="0" y="0"/>
+          <a:chExt cx="0" cy="0"/>
+        </a:xfrm>
+      </p:grpSpPr>
+      <p:sp>
+        <p:nvSpPr>
+          <p:cNvPr id="2" name="Título 1"/>
+          <p:cNvSpPr>
+            <a:spLocks noGrp="1"/>
+          </p:cNvSpPr>
+          <p:nvPr>
+            <p:ph type="title"/>
+          </p:nvPr>
+        </p:nvSpPr>
+        <p:spPr/>
+        <p:txBody>
+          <a:bodyPr/>
+          <a:lstStyle/>
+          <a:p>
+            <a:pPr fontAlgn="base"/>
+            <a:r>
+              <a:rPr lang="pt-BR" dirty="0" smtClean="0"/>
+              <a:t>Rotas</a:t>
+            </a:r>
+            <a:endParaRPr lang="pt-BR" dirty="0"/>
+          </a:p>
+        </p:txBody>
+      </p:sp>
+      <p:sp>
+        <p:nvSpPr>
+          <p:cNvPr id="3" name="Espaço Reservado para Conteúdo 2"/>
+          <p:cNvSpPr>
+            <a:spLocks noGrp="1"/>
+          </p:cNvSpPr>
+          <p:nvPr>
+            <p:ph idx="1"/>
+          </p:nvPr>
+        </p:nvSpPr>
+        <p:spPr/>
+        <p:txBody>
+          <a:bodyPr numCol="1">
+            <a:normAutofit/>
+          </a:bodyPr>
+          <a:lstStyle/>
+          <a:p>
+            <a:pPr fontAlgn="base"/>
+            <a:r>
+              <a:rPr lang="pt-BR" dirty="0" smtClean="0"/>
+              <a:t>Trabalhando </a:t>
+            </a:r>
+            <a:r>
+              <a:rPr lang="pt-BR" dirty="0"/>
+              <a:t>com rotas</a:t>
+            </a:r>
+          </a:p>
+          <a:p>
+            <a:pPr fontAlgn="base"/>
+            <a:r>
+              <a:rPr lang="pt-BR" dirty="0" err="1"/>
+              <a:t>Views</a:t>
+            </a:r>
+            <a:r>
+              <a:rPr lang="pt-BR" dirty="0"/>
+              <a:t>, rotas e </a:t>
+            </a:r>
+            <a:r>
+              <a:rPr lang="pt-BR" dirty="0" err="1"/>
+              <a:t>controllers</a:t>
+            </a:r>
+            <a:endParaRPr lang="pt-BR" dirty="0"/>
+          </a:p>
+          <a:p>
+            <a:pPr fontAlgn="base"/>
+            <a:endParaRPr lang="pt-BR" dirty="0"/>
+          </a:p>
+        </p:txBody>
+      </p:sp>
+    </p:spTree>
+    <p:extLst>
+      <p:ext uri="{BB962C8B-B14F-4D97-AF65-F5344CB8AC3E}">
+        <p14:creationId xmlns:p14="http://schemas.microsoft.com/office/powerpoint/2010/main" val="1816641699"/>
+      </p:ext>
+    </p:extLst>
+  </p:cSld>
+  <p:clrMapOvr>
+    <a:masterClrMapping/>
+  </p:clrMapOvr>
+  <p:transition xmlns:p14="http://schemas.microsoft.com/office/powerpoint/2010/main" spd="slow">
+    <p:push dir="u"/>
+  </p:transition>
+  <p:timing>
+    <p:tnLst>
+      <p:par>
+        <p:cTn xmlns:p14="http://schemas.microsoft.com/office/powerpoint/2010/main" id="1" dur="indefinite" restart="never" nodeType="tmRoot"/>
+      </p:par>
+    </p:tnLst>
+  </p:timing>
+</p:sld>
+</file>
+
+<file path=ppt/slides/slide27.xml><?xml version="1.0" encoding="utf-8"?>
+<p:sld xmlns:a="http://schemas.openxmlformats.org/drawingml/2006/main" xmlns:r="http://schemas.openxmlformats.org/officeDocument/2006/relationships" xmlns:p="http://schemas.openxmlformats.org/presentationml/2006/main">
+  <p:cSld>
+    <p:bg>
+      <p:bgPr>
+        <a:blipFill dpi="0" rotWithShape="1">
+          <a:blip r:embed="rId2">
+            <a:lum/>
+          </a:blip>
+          <a:srcRect/>
+          <a:stretch>
+            <a:fillRect/>
+          </a:stretch>
+        </a:blipFill>
+        <a:effectLst/>
+      </p:bgPr>
+    </p:bg>
+    <p:spTree>
+      <p:nvGrpSpPr>
+        <p:cNvPr id="1" name=""/>
+        <p:cNvGrpSpPr/>
+        <p:nvPr/>
+      </p:nvGrpSpPr>
+      <p:grpSpPr>
+        <a:xfrm>
+          <a:off x="0" y="0"/>
+          <a:ext cx="0" cy="0"/>
+          <a:chOff x="0" y="0"/>
+          <a:chExt cx="0" cy="0"/>
+        </a:xfrm>
+      </p:grpSpPr>
+      <p:sp>
+        <p:nvSpPr>
+          <p:cNvPr id="2" name="Título 1"/>
+          <p:cNvSpPr>
+            <a:spLocks noGrp="1"/>
+          </p:cNvSpPr>
+          <p:nvPr>
+            <p:ph type="title"/>
+          </p:nvPr>
+        </p:nvSpPr>
+        <p:spPr/>
+        <p:txBody>
+          <a:bodyPr/>
+          <a:lstStyle/>
+          <a:p>
+            <a:r>
+              <a:rPr lang="pt-BR" dirty="0" smtClean="0"/>
+              <a:t>DEMO</a:t>
+            </a:r>
+            <a:endParaRPr lang="pt-BR" dirty="0"/>
+          </a:p>
+        </p:txBody>
+      </p:sp>
+      <p:sp>
+        <p:nvSpPr>
+          <p:cNvPr id="5" name="Espaço Reservado para Conteúdo 4"/>
+          <p:cNvSpPr>
+            <a:spLocks noGrp="1"/>
+          </p:cNvSpPr>
+          <p:nvPr>
+            <p:ph type="body" idx="1"/>
+          </p:nvPr>
+        </p:nvSpPr>
+        <p:spPr/>
+        <p:txBody>
+          <a:bodyPr numCol="1">
+            <a:normAutofit/>
+          </a:bodyPr>
+          <a:lstStyle/>
+          <a:p>
+            <a:pPr lvl="1" fontAlgn="base"/>
+            <a:r>
+              <a:rPr lang="pt-BR" dirty="0" err="1" smtClean="0"/>
+              <a:t>Contruindo</a:t>
+            </a:r>
+            <a:r>
+              <a:rPr lang="pt-BR" dirty="0" smtClean="0"/>
+              <a:t> aplica</a:t>
+            </a:r>
+            <a:r>
+              <a:rPr lang="pt-BR" dirty="0" smtClean="0"/>
+              <a:t>ções com Rotas</a:t>
+            </a:r>
+            <a:endParaRPr lang="pt-BR" dirty="0" smtClean="0"/>
+          </a:p>
+        </p:txBody>
+      </p:sp>
+    </p:spTree>
+    <p:extLst>
+      <p:ext uri="{BB962C8B-B14F-4D97-AF65-F5344CB8AC3E}">
+        <p14:creationId xmlns:p14="http://schemas.microsoft.com/office/powerpoint/2010/main" val="674182273"/>
+      </p:ext>
+    </p:extLst>
+  </p:cSld>
+  <p:clrMapOvr>
+    <a:masterClrMapping/>
+  </p:clrMapOvr>
+  <p:transition xmlns:p14="http://schemas.microsoft.com/office/powerpoint/2010/main" spd="slow">
+    <p:push dir="u"/>
+  </p:transition>
+  <p:timing>
+    <p:tnLst>
+      <p:par>
+        <p:cTn xmlns:p14="http://schemas.microsoft.com/office/powerpoint/2010/main" id="1" dur="indefinite" restart="never" nodeType="tmRoot"/>
+      </p:par>
+    </p:tnLst>
+  </p:timing>
+</p:sld>
+</file>
+
+<file path=ppt/slides/slide28.xml><?xml version="1.0" encoding="utf-8"?>
+<p:sld xmlns:a="http://schemas.openxmlformats.org/drawingml/2006/main" xmlns:r="http://schemas.openxmlformats.org/officeDocument/2006/relationships" xmlns:p="http://schemas.openxmlformats.org/presentationml/2006/main">
+  <p:cSld>
+    <p:bg>
+      <p:bgPr>
+        <a:blipFill dpi="0" rotWithShape="1">
+          <a:blip r:embed="rId2">
+            <a:lum/>
+          </a:blip>
+          <a:srcRect/>
+          <a:stretch>
+            <a:fillRect/>
+          </a:stretch>
+        </a:blipFill>
+        <a:effectLst/>
+      </p:bgPr>
+    </p:bg>
+    <p:spTree>
+      <p:nvGrpSpPr>
+        <p:cNvPr id="1" name=""/>
+        <p:cNvGrpSpPr/>
+        <p:nvPr/>
+      </p:nvGrpSpPr>
+      <p:grpSpPr>
+        <a:xfrm>
+          <a:off x="0" y="0"/>
+          <a:ext cx="0" cy="0"/>
+          <a:chOff x="0" y="0"/>
+          <a:chExt cx="0" cy="0"/>
+        </a:xfrm>
+      </p:grpSpPr>
+      <p:sp>
+        <p:nvSpPr>
+          <p:cNvPr id="2" name="Título 1"/>
+          <p:cNvSpPr>
+            <a:spLocks noGrp="1"/>
+          </p:cNvSpPr>
+          <p:nvPr>
+            <p:ph type="title"/>
+          </p:nvPr>
+        </p:nvSpPr>
+        <p:spPr/>
+        <p:txBody>
+          <a:bodyPr/>
+          <a:lstStyle/>
+          <a:p>
+            <a:r>
+              <a:rPr lang="pt-BR" dirty="0" smtClean="0"/>
+              <a:t>Estruturando a Aplica</a:t>
+            </a:r>
+            <a:r>
+              <a:rPr lang="pt-BR" dirty="0" smtClean="0"/>
+              <a:t>ção</a:t>
+            </a:r>
+            <a:endParaRPr lang="pt-BR" dirty="0"/>
+          </a:p>
+        </p:txBody>
+      </p:sp>
+      <p:sp>
+        <p:nvSpPr>
+          <p:cNvPr id="4" name="Espaço Reservado para Texto 3"/>
+          <p:cNvSpPr>
+            <a:spLocks noGrp="1"/>
+          </p:cNvSpPr>
+          <p:nvPr>
+            <p:ph type="body" idx="1"/>
+          </p:nvPr>
+        </p:nvSpPr>
+        <p:spPr/>
+        <p:txBody>
+          <a:bodyPr/>
+          <a:lstStyle/>
+          <a:p>
+            <a:pPr marL="0" lvl="1">
+              <a:spcBef>
+                <a:spcPts val="1000"/>
+              </a:spcBef>
+            </a:pPr>
+            <a:r>
+              <a:rPr lang="pt-BR" dirty="0" smtClean="0"/>
+              <a:t>Módulo 4 – Aula </a:t>
+            </a:r>
+            <a:r>
+              <a:rPr lang="pt-BR" dirty="0"/>
+              <a:t>9</a:t>
+            </a:r>
+            <a:endParaRPr lang="pt-BR" dirty="0" smtClean="0"/>
+          </a:p>
+        </p:txBody>
+      </p:sp>
+    </p:spTree>
+    <p:extLst>
+      <p:ext uri="{BB962C8B-B14F-4D97-AF65-F5344CB8AC3E}">
+        <p14:creationId xmlns:p14="http://schemas.microsoft.com/office/powerpoint/2010/main" val="262740708"/>
+      </p:ext>
+    </p:extLst>
+  </p:cSld>
+  <p:clrMapOvr>
+    <a:masterClrMapping/>
+  </p:clrMapOvr>
+  <p:transition xmlns:p14="http://schemas.microsoft.com/office/powerpoint/2010/main" spd="slow">
+    <p:push dir="u"/>
+  </p:transition>
+  <p:timing>
+    <p:tnLst>
+      <p:par>
+        <p:cTn xmlns:p14="http://schemas.microsoft.com/office/powerpoint/2010/main" id="1" dur="indefinite" restart="never" nodeType="tmRoot"/>
+      </p:par>
+    </p:tnLst>
+  </p:timing>
+</p:sld>
+</file>
+
+<file path=ppt/slides/slide29.xml><?xml version="1.0" encoding="utf-8"?>
+<p:sld xmlns:a="http://schemas.openxmlformats.org/drawingml/2006/main" xmlns:r="http://schemas.openxmlformats.org/officeDocument/2006/relationships" xmlns:p="http://schemas.openxmlformats.org/presentationml/2006/main">
+  <p:cSld>
+    <p:bg>
+      <p:bgPr>
+        <a:blipFill dpi="0" rotWithShape="1">
+          <a:blip r:embed="rId2">
+            <a:lum/>
+          </a:blip>
+          <a:srcRect/>
+          <a:stretch>
+            <a:fillRect/>
+          </a:stretch>
+        </a:blipFill>
+        <a:effectLst/>
+      </p:bgPr>
+    </p:bg>
+    <p:spTree>
+      <p:nvGrpSpPr>
+        <p:cNvPr id="1" name=""/>
+        <p:cNvGrpSpPr/>
+        <p:nvPr/>
+      </p:nvGrpSpPr>
+      <p:grpSpPr>
+        <a:xfrm>
+          <a:off x="0" y="0"/>
+          <a:ext cx="0" cy="0"/>
+          <a:chOff x="0" y="0"/>
+          <a:chExt cx="0" cy="0"/>
+        </a:xfrm>
+      </p:grpSpPr>
+      <p:sp>
+        <p:nvSpPr>
+          <p:cNvPr id="2" name="Título 1"/>
+          <p:cNvSpPr>
+            <a:spLocks noGrp="1"/>
+          </p:cNvSpPr>
+          <p:nvPr>
+            <p:ph type="title"/>
+          </p:nvPr>
+        </p:nvSpPr>
+        <p:spPr/>
+        <p:txBody>
+          <a:bodyPr/>
+          <a:lstStyle/>
+          <a:p>
+            <a:pPr fontAlgn="base"/>
+            <a:r>
+              <a:rPr lang="pt-BR" dirty="0" smtClean="0"/>
+              <a:t>Estruturando a Aplicação</a:t>
+            </a:r>
+            <a:endParaRPr lang="pt-BR" dirty="0"/>
+          </a:p>
+        </p:txBody>
+      </p:sp>
+      <p:sp>
+        <p:nvSpPr>
+          <p:cNvPr id="3" name="Espaço Reservado para Conteúdo 2"/>
+          <p:cNvSpPr>
+            <a:spLocks noGrp="1"/>
+          </p:cNvSpPr>
+          <p:nvPr>
+            <p:ph idx="1"/>
+          </p:nvPr>
+        </p:nvSpPr>
+        <p:spPr/>
+        <p:txBody>
+          <a:bodyPr numCol="1">
+            <a:normAutofit/>
+          </a:bodyPr>
+          <a:lstStyle/>
+          <a:p>
+            <a:pPr fontAlgn="base"/>
+            <a:r>
+              <a:rPr lang="pt-BR" dirty="0" smtClean="0"/>
+              <a:t>Estrutura </a:t>
+            </a:r>
+            <a:r>
+              <a:rPr lang="pt-BR" dirty="0"/>
+              <a:t>por tipos</a:t>
+            </a:r>
+          </a:p>
+          <a:p>
+            <a:pPr fontAlgn="base"/>
+            <a:r>
+              <a:rPr lang="pt-BR" dirty="0"/>
+              <a:t>Estrutura por módulos</a:t>
+            </a:r>
+          </a:p>
+          <a:p>
+            <a:pPr fontAlgn="base"/>
+            <a:r>
+              <a:rPr lang="pt-BR" dirty="0"/>
+              <a:t>Estrutura por componentes</a:t>
+            </a:r>
+          </a:p>
+          <a:p>
+            <a:pPr fontAlgn="base"/>
+            <a:endParaRPr lang="pt-BR" dirty="0"/>
+          </a:p>
+        </p:txBody>
+      </p:sp>
+    </p:spTree>
+    <p:extLst>
+      <p:ext uri="{BB962C8B-B14F-4D97-AF65-F5344CB8AC3E}">
+        <p14:creationId xmlns:p14="http://schemas.microsoft.com/office/powerpoint/2010/main" val="382626703"/>
       </p:ext>
     </p:extLst>
   </p:cSld>
@@ -4822,11 +5672,7 @@
           <a:p>
             <a:r>
               <a:rPr lang="pt-BR" dirty="0" err="1" smtClean="0"/>
-              <a:t>Kick</a:t>
-            </a:r>
-            <a:r>
-              <a:rPr lang="pt-BR" dirty="0" err="1" smtClean="0"/>
-              <a:t>start</a:t>
+              <a:t>Kickstart</a:t>
             </a:r>
             <a:endParaRPr lang="pt-BR" dirty="0"/>
           </a:p>
@@ -4854,15 +5700,7 @@
             </a:pPr>
             <a:r>
               <a:rPr lang="pt-BR" dirty="0" smtClean="0"/>
-              <a:t>Módulo </a:t>
-            </a:r>
-            <a:r>
-              <a:rPr lang="pt-BR" dirty="0" smtClean="0"/>
-              <a:t>4 </a:t>
-            </a:r>
-            <a:r>
-              <a:rPr lang="pt-BR" dirty="0" smtClean="0"/>
-              <a:t>– Aula 1</a:t>
+              <a:t>Módulo 4 – Aula 1</a:t>
             </a:r>
           </a:p>
         </p:txBody>
@@ -4871,6 +5709,343 @@
     <p:extLst>
       <p:ext uri="{BB962C8B-B14F-4D97-AF65-F5344CB8AC3E}">
         <p14:creationId xmlns:p14="http://schemas.microsoft.com/office/powerpoint/2010/main" val="808755862"/>
+      </p:ext>
+    </p:extLst>
+  </p:cSld>
+  <p:clrMapOvr>
+    <a:masterClrMapping/>
+  </p:clrMapOvr>
+  <p:transition xmlns:p14="http://schemas.microsoft.com/office/powerpoint/2010/main" spd="slow">
+    <p:push dir="u"/>
+  </p:transition>
+  <p:timing>
+    <p:tnLst>
+      <p:par>
+        <p:cTn xmlns:p14="http://schemas.microsoft.com/office/powerpoint/2010/main" id="1" dur="indefinite" restart="never" nodeType="tmRoot"/>
+      </p:par>
+    </p:tnLst>
+  </p:timing>
+</p:sld>
+</file>
+
+<file path=ppt/slides/slide30.xml><?xml version="1.0" encoding="utf-8"?>
+<p:sld xmlns:a="http://schemas.openxmlformats.org/drawingml/2006/main" xmlns:r="http://schemas.openxmlformats.org/officeDocument/2006/relationships" xmlns:p="http://schemas.openxmlformats.org/presentationml/2006/main">
+  <p:cSld>
+    <p:bg>
+      <p:bgPr>
+        <a:blipFill dpi="0" rotWithShape="1">
+          <a:blip r:embed="rId2">
+            <a:lum/>
+          </a:blip>
+          <a:srcRect/>
+          <a:stretch>
+            <a:fillRect/>
+          </a:stretch>
+        </a:blipFill>
+        <a:effectLst/>
+      </p:bgPr>
+    </p:bg>
+    <p:spTree>
+      <p:nvGrpSpPr>
+        <p:cNvPr id="1" name=""/>
+        <p:cNvGrpSpPr/>
+        <p:nvPr/>
+      </p:nvGrpSpPr>
+      <p:grpSpPr>
+        <a:xfrm>
+          <a:off x="0" y="0"/>
+          <a:ext cx="0" cy="0"/>
+          <a:chOff x="0" y="0"/>
+          <a:chExt cx="0" cy="0"/>
+        </a:xfrm>
+      </p:grpSpPr>
+      <p:sp>
+        <p:nvSpPr>
+          <p:cNvPr id="2" name="Título 1"/>
+          <p:cNvSpPr>
+            <a:spLocks noGrp="1"/>
+          </p:cNvSpPr>
+          <p:nvPr>
+            <p:ph type="title"/>
+          </p:nvPr>
+        </p:nvSpPr>
+        <p:spPr/>
+        <p:txBody>
+          <a:bodyPr/>
+          <a:lstStyle/>
+          <a:p>
+            <a:r>
+              <a:rPr lang="pt-BR" dirty="0" smtClean="0"/>
+              <a:t>DEMO</a:t>
+            </a:r>
+            <a:endParaRPr lang="pt-BR" dirty="0"/>
+          </a:p>
+        </p:txBody>
+      </p:sp>
+      <p:sp>
+        <p:nvSpPr>
+          <p:cNvPr id="5" name="Espaço Reservado para Conteúdo 4"/>
+          <p:cNvSpPr>
+            <a:spLocks noGrp="1"/>
+          </p:cNvSpPr>
+          <p:nvPr>
+            <p:ph type="body" idx="1"/>
+          </p:nvPr>
+        </p:nvSpPr>
+        <p:spPr/>
+        <p:txBody>
+          <a:bodyPr numCol="1">
+            <a:normAutofit/>
+          </a:bodyPr>
+          <a:lstStyle/>
+          <a:p>
+            <a:pPr lvl="1" fontAlgn="base"/>
+            <a:r>
+              <a:rPr lang="pt-BR" dirty="0" smtClean="0"/>
+              <a:t>Estruturando por Tipos</a:t>
+            </a:r>
+          </a:p>
+          <a:p>
+            <a:pPr lvl="1" fontAlgn="base"/>
+            <a:r>
+              <a:rPr lang="pt-BR" dirty="0" smtClean="0"/>
+              <a:t>Estruturando por M</a:t>
+            </a:r>
+            <a:r>
+              <a:rPr lang="pt-BR" dirty="0" smtClean="0"/>
+              <a:t>ódulos</a:t>
+            </a:r>
+          </a:p>
+          <a:p>
+            <a:pPr lvl="1" fontAlgn="base"/>
+            <a:r>
+              <a:rPr lang="pt-BR" dirty="0" smtClean="0"/>
+              <a:t>Estruturando por Componentes</a:t>
+            </a:r>
+            <a:endParaRPr lang="pt-BR" dirty="0" smtClean="0"/>
+          </a:p>
+        </p:txBody>
+      </p:sp>
+    </p:spTree>
+    <p:extLst>
+      <p:ext uri="{BB962C8B-B14F-4D97-AF65-F5344CB8AC3E}">
+        <p14:creationId xmlns:p14="http://schemas.microsoft.com/office/powerpoint/2010/main" val="2599611067"/>
+      </p:ext>
+    </p:extLst>
+  </p:cSld>
+  <p:clrMapOvr>
+    <a:masterClrMapping/>
+  </p:clrMapOvr>
+  <p:transition xmlns:p14="http://schemas.microsoft.com/office/powerpoint/2010/main" spd="slow">
+    <p:push dir="u"/>
+  </p:transition>
+  <p:timing>
+    <p:tnLst>
+      <p:par>
+        <p:cTn xmlns:p14="http://schemas.microsoft.com/office/powerpoint/2010/main" id="1" dur="indefinite" restart="never" nodeType="tmRoot"/>
+      </p:par>
+    </p:tnLst>
+  </p:timing>
+</p:sld>
+</file>
+
+<file path=ppt/slides/slide31.xml><?xml version="1.0" encoding="utf-8"?>
+<p:sld xmlns:a="http://schemas.openxmlformats.org/drawingml/2006/main" xmlns:r="http://schemas.openxmlformats.org/officeDocument/2006/relationships" xmlns:p="http://schemas.openxmlformats.org/presentationml/2006/main">
+  <p:cSld>
+    <p:bg>
+      <p:bgPr>
+        <a:blipFill dpi="0" rotWithShape="1">
+          <a:blip r:embed="rId2">
+            <a:lum/>
+          </a:blip>
+          <a:srcRect/>
+          <a:stretch>
+            <a:fillRect/>
+          </a:stretch>
+        </a:blipFill>
+        <a:effectLst/>
+      </p:bgPr>
+    </p:bg>
+    <p:spTree>
+      <p:nvGrpSpPr>
+        <p:cNvPr id="1" name=""/>
+        <p:cNvGrpSpPr/>
+        <p:nvPr/>
+      </p:nvGrpSpPr>
+      <p:grpSpPr>
+        <a:xfrm>
+          <a:off x="0" y="0"/>
+          <a:ext cx="0" cy="0"/>
+          <a:chOff x="0" y="0"/>
+          <a:chExt cx="0" cy="0"/>
+        </a:xfrm>
+      </p:grpSpPr>
+      <p:sp>
+        <p:nvSpPr>
+          <p:cNvPr id="2" name="Título 1"/>
+          <p:cNvSpPr>
+            <a:spLocks noGrp="1"/>
+          </p:cNvSpPr>
+          <p:nvPr>
+            <p:ph type="title"/>
+          </p:nvPr>
+        </p:nvSpPr>
+        <p:spPr/>
+        <p:txBody>
+          <a:bodyPr/>
+          <a:lstStyle/>
+          <a:p>
+            <a:r>
+              <a:rPr lang="pt-BR" dirty="0" smtClean="0"/>
+              <a:t>CRUD</a:t>
+            </a:r>
+            <a:endParaRPr lang="pt-BR" dirty="0"/>
+          </a:p>
+        </p:txBody>
+      </p:sp>
+      <p:sp>
+        <p:nvSpPr>
+          <p:cNvPr id="4" name="Espaço Reservado para Texto 3"/>
+          <p:cNvSpPr>
+            <a:spLocks noGrp="1"/>
+          </p:cNvSpPr>
+          <p:nvPr>
+            <p:ph type="body" idx="1"/>
+          </p:nvPr>
+        </p:nvSpPr>
+        <p:spPr/>
+        <p:txBody>
+          <a:bodyPr/>
+          <a:lstStyle/>
+          <a:p>
+            <a:pPr marL="0" lvl="1">
+              <a:spcBef>
+                <a:spcPts val="1000"/>
+              </a:spcBef>
+            </a:pPr>
+            <a:r>
+              <a:rPr lang="pt-BR" dirty="0" smtClean="0"/>
+              <a:t>Módulo 4 – Aula </a:t>
+            </a:r>
+            <a:r>
+              <a:rPr lang="pt-BR" dirty="0" smtClean="0"/>
+              <a:t>10</a:t>
+            </a:r>
+            <a:endParaRPr lang="pt-BR" dirty="0" smtClean="0"/>
+          </a:p>
+        </p:txBody>
+      </p:sp>
+    </p:spTree>
+    <p:extLst>
+      <p:ext uri="{BB962C8B-B14F-4D97-AF65-F5344CB8AC3E}">
+        <p14:creationId xmlns:p14="http://schemas.microsoft.com/office/powerpoint/2010/main" val="3150179261"/>
+      </p:ext>
+    </p:extLst>
+  </p:cSld>
+  <p:clrMapOvr>
+    <a:masterClrMapping/>
+  </p:clrMapOvr>
+  <p:transition xmlns:p14="http://schemas.microsoft.com/office/powerpoint/2010/main" spd="slow">
+    <p:push dir="u"/>
+  </p:transition>
+  <p:timing>
+    <p:tnLst>
+      <p:par>
+        <p:cTn xmlns:p14="http://schemas.microsoft.com/office/powerpoint/2010/main" id="1" dur="indefinite" restart="never" nodeType="tmRoot"/>
+      </p:par>
+    </p:tnLst>
+  </p:timing>
+</p:sld>
+</file>
+
+<file path=ppt/slides/slide32.xml><?xml version="1.0" encoding="utf-8"?>
+<p:sld xmlns:a="http://schemas.openxmlformats.org/drawingml/2006/main" xmlns:r="http://schemas.openxmlformats.org/officeDocument/2006/relationships" xmlns:p="http://schemas.openxmlformats.org/presentationml/2006/main">
+  <p:cSld>
+    <p:bg>
+      <p:bgPr>
+        <a:blipFill dpi="0" rotWithShape="1">
+          <a:blip r:embed="rId2">
+            <a:lum/>
+          </a:blip>
+          <a:srcRect/>
+          <a:stretch>
+            <a:fillRect/>
+          </a:stretch>
+        </a:blipFill>
+        <a:effectLst/>
+      </p:bgPr>
+    </p:bg>
+    <p:spTree>
+      <p:nvGrpSpPr>
+        <p:cNvPr id="1" name=""/>
+        <p:cNvGrpSpPr/>
+        <p:nvPr/>
+      </p:nvGrpSpPr>
+      <p:grpSpPr>
+        <a:xfrm>
+          <a:off x="0" y="0"/>
+          <a:ext cx="0" cy="0"/>
+          <a:chOff x="0" y="0"/>
+          <a:chExt cx="0" cy="0"/>
+        </a:xfrm>
+      </p:grpSpPr>
+      <p:sp>
+        <p:nvSpPr>
+          <p:cNvPr id="2" name="Título 1"/>
+          <p:cNvSpPr>
+            <a:spLocks noGrp="1"/>
+          </p:cNvSpPr>
+          <p:nvPr>
+            <p:ph type="title"/>
+          </p:nvPr>
+        </p:nvSpPr>
+        <p:spPr/>
+        <p:txBody>
+          <a:bodyPr/>
+          <a:lstStyle/>
+          <a:p>
+            <a:r>
+              <a:rPr lang="pt-BR" dirty="0" smtClean="0"/>
+              <a:t>DEMO</a:t>
+            </a:r>
+            <a:endParaRPr lang="pt-BR" dirty="0"/>
+          </a:p>
+        </p:txBody>
+      </p:sp>
+      <p:sp>
+        <p:nvSpPr>
+          <p:cNvPr id="5" name="Espaço Reservado para Conteúdo 4"/>
+          <p:cNvSpPr>
+            <a:spLocks noGrp="1"/>
+          </p:cNvSpPr>
+          <p:nvPr>
+            <p:ph type="body" idx="1"/>
+          </p:nvPr>
+        </p:nvSpPr>
+        <p:spPr/>
+        <p:txBody>
+          <a:bodyPr numCol="1">
+            <a:normAutofit/>
+          </a:bodyPr>
+          <a:lstStyle/>
+          <a:p>
+            <a:pPr lvl="1" fontAlgn="base"/>
+            <a:r>
+              <a:rPr lang="pt-BR" dirty="0" smtClean="0"/>
+              <a:t>Criando uma aplica</a:t>
+            </a:r>
+            <a:r>
+              <a:rPr lang="pt-BR" dirty="0" smtClean="0"/>
+              <a:t>ção CRUD</a:t>
+            </a:r>
+            <a:endParaRPr lang="pt-BR" dirty="0" smtClean="0"/>
+          </a:p>
+        </p:txBody>
+      </p:sp>
+    </p:spTree>
+    <p:extLst>
+      <p:ext uri="{BB962C8B-B14F-4D97-AF65-F5344CB8AC3E}">
+        <p14:creationId xmlns:p14="http://schemas.microsoft.com/office/powerpoint/2010/main" val="360741363"/>
       </p:ext>
     </p:extLst>
   </p:cSld>
@@ -4971,17 +6146,6 @@
               <a:t>angularjs</a:t>
             </a:r>
             <a:endParaRPr lang="pt-BR" dirty="0" smtClean="0"/>
-          </a:p>
-          <a:p>
-            <a:pPr fontAlgn="base"/>
-            <a:r>
-              <a:rPr lang="pt-BR" dirty="0" err="1" smtClean="0"/>
-              <a:t>Mv</a:t>
-            </a:r>
-            <a:r>
-              <a:rPr lang="pt-BR" dirty="0" smtClean="0"/>
-              <a:t>*</a:t>
-            </a:r>
           </a:p>
           <a:p>
             <a:pPr fontAlgn="base"/>
@@ -5095,7 +6259,11 @@
           <a:p>
             <a:r>
               <a:rPr lang="pt-BR" dirty="0" smtClean="0"/>
-              <a:t>DEMO</a:t>
+              <a:t>Sobre o </a:t>
+            </a:r>
+            <a:r>
+              <a:rPr lang="pt-BR" dirty="0" err="1" smtClean="0"/>
+              <a:t>AngularJS</a:t>
             </a:r>
             <a:endParaRPr lang="pt-BR" dirty="0"/>
           </a:p>
@@ -5103,12 +6271,12 @@
       </p:sp>
       <p:sp>
         <p:nvSpPr>
-          <p:cNvPr id="5" name="Espaço Reservado para Conteúdo 4"/>
-          <p:cNvSpPr>
-            <a:spLocks noGrp="1"/>
-          </p:cNvSpPr>
-          <p:nvPr>
-            <p:ph type="body" idx="1"/>
+          <p:cNvPr id="3" name="Espaço Reservado para Conteúdo 2"/>
+          <p:cNvSpPr>
+            <a:spLocks noGrp="1"/>
+          </p:cNvSpPr>
+          <p:nvPr>
+            <p:ph idx="1"/>
           </p:nvPr>
         </p:nvSpPr>
         <p:spPr/>
@@ -5118,27 +6286,56 @@
           </a:bodyPr>
           <a:lstStyle/>
           <a:p>
-            <a:pPr lvl="1" fontAlgn="base"/>
-            <a:r>
-              <a:rPr lang="pt-BR" dirty="0" smtClean="0"/>
-              <a:t>Sua primeira p</a:t>
-            </a:r>
-            <a:r>
-              <a:rPr lang="pt-BR" dirty="0" smtClean="0"/>
-              <a:t>ágina com </a:t>
-            </a:r>
+            <a:pPr fontAlgn="base"/>
             <a:r>
               <a:rPr lang="pt-BR" dirty="0" err="1" smtClean="0"/>
-              <a:t>angularjs</a:t>
-            </a:r>
-            <a:endParaRPr lang="pt-BR" dirty="0" smtClean="0"/>
+              <a:t>Potencializador</a:t>
+            </a:r>
+            <a:r>
+              <a:rPr lang="pt-BR" dirty="0" smtClean="0"/>
+              <a:t> do HTML</a:t>
+            </a:r>
+          </a:p>
+          <a:p>
+            <a:pPr fontAlgn="base"/>
+            <a:r>
+              <a:rPr lang="pt-BR" dirty="0" smtClean="0"/>
+              <a:t>Framework </a:t>
+            </a:r>
+            <a:r>
+              <a:rPr lang="pt-BR" dirty="0" err="1" smtClean="0"/>
+              <a:t>Mv</a:t>
+            </a:r>
+            <a:r>
+              <a:rPr lang="pt-BR" dirty="0" smtClean="0"/>
+              <a:t>*</a:t>
+            </a:r>
+          </a:p>
+          <a:p>
+            <a:pPr fontAlgn="base"/>
+            <a:r>
+              <a:rPr lang="pt-BR" dirty="0" smtClean="0"/>
+              <a:t>Mantido pela Google</a:t>
+            </a:r>
+          </a:p>
+          <a:p>
+            <a:pPr fontAlgn="base"/>
+            <a:r>
+              <a:rPr lang="pt-BR" dirty="0" smtClean="0"/>
+              <a:t>Queridinho dos </a:t>
+            </a:r>
+            <a:r>
+              <a:rPr lang="pt-BR" dirty="0" err="1" smtClean="0"/>
+              <a:t>DEVs</a:t>
+            </a:r>
+            <a:endParaRPr lang="pt-BR" dirty="0"/>
           </a:p>
         </p:txBody>
       </p:sp>
     </p:spTree>
     <p:extLst>
       <p:ext uri="{BB962C8B-B14F-4D97-AF65-F5344CB8AC3E}">
-        <p14:creationId xmlns:p14="http://schemas.microsoft.com/office/powerpoint/2010/main" val="13331749"/>
+        <p14:creationId xmlns:p14="http://schemas.microsoft.com/office/powerpoint/2010/main" val="1644501570"/>
       </p:ext>
     </p:extLst>
   </p:cSld>
@@ -5205,57 +6402,93 @@
           <a:lstStyle/>
           <a:p>
             <a:r>
+              <a:rPr lang="pt-BR" dirty="0" smtClean="0"/>
+              <a:t>Sobre o </a:t>
+            </a:r>
+            <a:r>
+              <a:rPr lang="pt-BR" dirty="0" err="1" smtClean="0"/>
+              <a:t>AngularJS</a:t>
+            </a:r>
+            <a:endParaRPr lang="pt-BR" dirty="0"/>
+          </a:p>
+        </p:txBody>
+      </p:sp>
+      <p:sp>
+        <p:nvSpPr>
+          <p:cNvPr id="3" name="Espaço Reservado para Conteúdo 2"/>
+          <p:cNvSpPr>
+            <a:spLocks noGrp="1"/>
+          </p:cNvSpPr>
+          <p:nvPr>
+            <p:ph idx="1"/>
+          </p:nvPr>
+        </p:nvSpPr>
+        <p:spPr/>
+        <p:txBody>
+          <a:bodyPr numCol="1">
+            <a:normAutofit/>
+          </a:bodyPr>
+          <a:lstStyle/>
+          <a:p>
+            <a:pPr fontAlgn="base"/>
+            <a:r>
+              <a:rPr lang="pt-BR" dirty="0" err="1" smtClean="0"/>
+              <a:t>Models</a:t>
+            </a:r>
+            <a:endParaRPr lang="pt-BR" dirty="0" smtClean="0"/>
+          </a:p>
+          <a:p>
+            <a:pPr fontAlgn="base"/>
+            <a:r>
+              <a:rPr lang="pt-BR" dirty="0" err="1" smtClean="0"/>
+              <a:t>Views</a:t>
+            </a:r>
+            <a:endParaRPr lang="pt-BR" dirty="0" smtClean="0"/>
+          </a:p>
+          <a:p>
+            <a:pPr fontAlgn="base"/>
+            <a:r>
+              <a:rPr lang="pt-BR" dirty="0" smtClean="0"/>
+              <a:t>*</a:t>
+            </a:r>
+          </a:p>
+          <a:p>
+            <a:pPr lvl="1" fontAlgn="base"/>
+            <a:r>
               <a:rPr lang="pt-BR" dirty="0" err="1" smtClean="0"/>
               <a:t>Controllers</a:t>
             </a:r>
+            <a:endParaRPr lang="pt-BR" dirty="0" smtClean="0"/>
+          </a:p>
+          <a:p>
+            <a:pPr lvl="1" fontAlgn="base"/>
+            <a:r>
+              <a:rPr lang="pt-BR" dirty="0" err="1" smtClean="0"/>
+              <a:t>Directives</a:t>
+            </a:r>
+            <a:endParaRPr lang="pt-BR" dirty="0" smtClean="0"/>
+          </a:p>
+          <a:p>
+            <a:pPr lvl="1" fontAlgn="base"/>
+            <a:r>
+              <a:rPr lang="pt-BR" dirty="0" smtClean="0"/>
+              <a:t>Services</a:t>
+            </a:r>
+          </a:p>
+          <a:p>
+            <a:pPr lvl="1" fontAlgn="base"/>
+            <a:r>
+              <a:rPr lang="pt-BR" dirty="0" err="1" smtClean="0"/>
+              <a:t>Factories</a:t>
+            </a:r>
             <a:endParaRPr lang="pt-BR" dirty="0"/>
-          </a:p>
-        </p:txBody>
-      </p:sp>
-      <p:sp>
-        <p:nvSpPr>
-          <p:cNvPr id="4" name="Espaço Reservado para Texto 3"/>
-          <p:cNvSpPr>
-            <a:spLocks noGrp="1"/>
-          </p:cNvSpPr>
-          <p:nvPr>
-            <p:ph type="body" idx="1"/>
-          </p:nvPr>
-        </p:nvSpPr>
-        <p:spPr/>
-        <p:txBody>
-          <a:bodyPr/>
-          <a:lstStyle/>
-          <a:p>
-            <a:pPr marL="0" lvl="1">
-              <a:spcBef>
-                <a:spcPts val="1000"/>
-              </a:spcBef>
-            </a:pPr>
-            <a:r>
-              <a:rPr lang="pt-BR" dirty="0" smtClean="0"/>
-              <a:t>Módulo </a:t>
-            </a:r>
-            <a:r>
-              <a:rPr lang="pt-BR" dirty="0" smtClean="0"/>
-              <a:t>4 </a:t>
-            </a:r>
-            <a:r>
-              <a:rPr lang="pt-BR" dirty="0" smtClean="0"/>
-              <a:t>– Aula </a:t>
-            </a:r>
-            <a:r>
-              <a:rPr lang="pt-BR" dirty="0" smtClean="0"/>
-              <a:t>2</a:t>
-            </a:r>
-            <a:endParaRPr lang="pt-BR" dirty="0" smtClean="0"/>
           </a:p>
         </p:txBody>
       </p:sp>
     </p:spTree>
     <p:extLst>
       <p:ext uri="{BB962C8B-B14F-4D97-AF65-F5344CB8AC3E}">
-        <p14:creationId xmlns:p14="http://schemas.microsoft.com/office/powerpoint/2010/main" val="230224703"/>
+        <p14:creationId xmlns:p14="http://schemas.microsoft.com/office/powerpoint/2010/main" val="2752418505"/>
       </p:ext>
     </p:extLst>
   </p:cSld>
@@ -5322,8 +6555,8 @@
           <a:lstStyle/>
           <a:p>
             <a:r>
-              <a:rPr lang="pt-BR" dirty="0" err="1" smtClean="0"/>
-              <a:t>Controllers</a:t>
+              <a:rPr lang="pt-BR" dirty="0" smtClean="0"/>
+              <a:t>DEMO</a:t>
             </a:r>
             <a:endParaRPr lang="pt-BR" dirty="0"/>
           </a:p>
@@ -5331,12 +6564,12 @@
       </p:sp>
       <p:sp>
         <p:nvSpPr>
-          <p:cNvPr id="3" name="Espaço Reservado para Conteúdo 2"/>
-          <p:cNvSpPr>
-            <a:spLocks noGrp="1"/>
-          </p:cNvSpPr>
-          <p:nvPr>
-            <p:ph idx="1"/>
+          <p:cNvPr id="5" name="Espaço Reservado para Conteúdo 4"/>
+          <p:cNvSpPr>
+            <a:spLocks noGrp="1"/>
+          </p:cNvSpPr>
+          <p:nvPr>
+            <p:ph type="body" idx="1"/>
           </p:nvPr>
         </p:nvSpPr>
         <p:spPr/>
@@ -5346,62 +6579,23 @@
           </a:bodyPr>
           <a:lstStyle/>
           <a:p>
-            <a:pPr fontAlgn="base"/>
-            <a:r>
-              <a:rPr lang="pt-BR" dirty="0" smtClean="0"/>
-              <a:t>Criando </a:t>
-            </a:r>
-            <a:r>
-              <a:rPr lang="pt-BR" dirty="0"/>
-              <a:t>um </a:t>
-            </a:r>
-            <a:r>
-              <a:rPr lang="pt-BR" dirty="0" err="1"/>
-              <a:t>controller</a:t>
-            </a:r>
-            <a:endParaRPr lang="pt-BR" dirty="0"/>
-          </a:p>
-          <a:p>
-            <a:pPr fontAlgn="base"/>
-            <a:r>
-              <a:rPr lang="pt-BR" dirty="0"/>
-              <a:t>$</a:t>
-            </a:r>
-            <a:r>
-              <a:rPr lang="pt-BR" dirty="0" err="1"/>
-              <a:t>scope</a:t>
-            </a:r>
-            <a:endParaRPr lang="pt-BR" dirty="0"/>
-          </a:p>
-          <a:p>
-            <a:pPr fontAlgn="base"/>
-            <a:r>
-              <a:rPr lang="pt-BR" dirty="0"/>
-              <a:t>NG-</a:t>
-            </a:r>
-            <a:r>
-              <a:rPr lang="pt-BR" dirty="0" err="1"/>
-              <a:t>controller</a:t>
-            </a:r>
-            <a:endParaRPr lang="pt-BR" dirty="0"/>
-          </a:p>
-          <a:p>
-            <a:pPr fontAlgn="base"/>
-            <a:r>
-              <a:rPr lang="pt-BR" dirty="0" err="1"/>
-              <a:t>Ng</a:t>
-            </a:r>
-            <a:r>
-              <a:rPr lang="pt-BR" dirty="0"/>
-              <a:t>-click</a:t>
-            </a:r>
+            <a:pPr lvl="1" fontAlgn="base"/>
+            <a:r>
+              <a:rPr lang="pt-BR" dirty="0" smtClean="0"/>
+              <a:t>Sua primeira página com </a:t>
+            </a:r>
+            <a:r>
+              <a:rPr lang="pt-BR" dirty="0" err="1" smtClean="0"/>
+              <a:t>angularjs</a:t>
+            </a:r>
+            <a:endParaRPr lang="pt-BR" dirty="0" smtClean="0"/>
           </a:p>
         </p:txBody>
       </p:sp>
     </p:spTree>
     <p:extLst>
       <p:ext uri="{BB962C8B-B14F-4D97-AF65-F5344CB8AC3E}">
-        <p14:creationId xmlns:p14="http://schemas.microsoft.com/office/powerpoint/2010/main" val="220843279"/>
+        <p14:creationId xmlns:p14="http://schemas.microsoft.com/office/powerpoint/2010/main" val="13331749"/>
       </p:ext>
     </p:extLst>
   </p:cSld>
@@ -5468,8 +6662,8 @@
           <a:lstStyle/>
           <a:p>
             <a:r>
-              <a:rPr lang="pt-BR" dirty="0" smtClean="0"/>
-              <a:t>DEMO</a:t>
+              <a:rPr lang="pt-BR" dirty="0" err="1" smtClean="0"/>
+              <a:t>Controllers</a:t>
             </a:r>
             <a:endParaRPr lang="pt-BR" dirty="0"/>
           </a:p>
@@ -5477,7 +6671,7 @@
       </p:sp>
       <p:sp>
         <p:nvSpPr>
-          <p:cNvPr id="5" name="Espaço Reservado para Conteúdo 4"/>
+          <p:cNvPr id="4" name="Espaço Reservado para Texto 3"/>
           <p:cNvSpPr>
             <a:spLocks noGrp="1"/>
           </p:cNvSpPr>
@@ -5487,28 +6681,25 @@
         </p:nvSpPr>
         <p:spPr/>
         <p:txBody>
-          <a:bodyPr numCol="1">
-            <a:normAutofit/>
-          </a:bodyPr>
-          <a:lstStyle/>
-          <a:p>
-            <a:pPr lvl="1" fontAlgn="base"/>
-            <a:r>
-              <a:rPr lang="pt-BR" dirty="0" smtClean="0"/>
-              <a:t>Criando um </a:t>
-            </a:r>
-            <a:r>
-              <a:rPr lang="pt-BR" dirty="0" err="1" smtClean="0"/>
-              <a:t>controller</a:t>
-            </a:r>
-            <a:endParaRPr lang="pt-BR" dirty="0" smtClean="0"/>
+          <a:bodyPr/>
+          <a:lstStyle/>
+          <a:p>
+            <a:pPr marL="0" lvl="1">
+              <a:spcBef>
+                <a:spcPts val="1000"/>
+              </a:spcBef>
+            </a:pPr>
+            <a:r>
+              <a:rPr lang="pt-BR" dirty="0" smtClean="0"/>
+              <a:t>Módulo 4 – Aula 2</a:t>
+            </a:r>
           </a:p>
         </p:txBody>
       </p:sp>
     </p:spTree>
     <p:extLst>
       <p:ext uri="{BB962C8B-B14F-4D97-AF65-F5344CB8AC3E}">
-        <p14:creationId xmlns:p14="http://schemas.microsoft.com/office/powerpoint/2010/main" val="783120885"/>
+        <p14:creationId xmlns:p14="http://schemas.microsoft.com/office/powerpoint/2010/main" val="230224703"/>
       </p:ext>
     </p:extLst>
   </p:cSld>
@@ -5575,8 +6766,8 @@
           <a:lstStyle/>
           <a:p>
             <a:r>
-              <a:rPr lang="pt-BR" dirty="0" smtClean="0"/>
-              <a:t>Listas</a:t>
+              <a:rPr lang="pt-BR" dirty="0" err="1" smtClean="0"/>
+              <a:t>Controllers</a:t>
             </a:r>
             <a:endParaRPr lang="pt-BR" dirty="0"/>
           </a:p>
@@ -5584,48 +6775,77 @@
       </p:sp>
       <p:sp>
         <p:nvSpPr>
-          <p:cNvPr id="4" name="Espaço Reservado para Texto 3"/>
-          <p:cNvSpPr>
-            <a:spLocks noGrp="1"/>
-          </p:cNvSpPr>
-          <p:nvPr>
-            <p:ph type="body" idx="1"/>
-          </p:nvPr>
-        </p:nvSpPr>
-        <p:spPr/>
-        <p:txBody>
-          <a:bodyPr/>
-          <a:lstStyle/>
-          <a:p>
-            <a:pPr marL="0" lvl="1">
-              <a:spcBef>
-                <a:spcPts val="1000"/>
-              </a:spcBef>
-            </a:pPr>
-            <a:r>
-              <a:rPr lang="pt-BR" dirty="0" smtClean="0"/>
-              <a:t>Módulo </a:t>
-            </a:r>
-            <a:r>
-              <a:rPr lang="pt-BR" dirty="0" smtClean="0"/>
-              <a:t>4 </a:t>
-            </a:r>
-            <a:r>
-              <a:rPr lang="pt-BR" dirty="0" smtClean="0"/>
-              <a:t>– Aula </a:t>
-            </a:r>
-            <a:r>
-              <a:rPr lang="pt-BR" dirty="0" smtClean="0"/>
-              <a:t>3</a:t>
-            </a:r>
-            <a:endParaRPr lang="pt-BR" dirty="0" smtClean="0"/>
+          <p:cNvPr id="3" name="Espaço Reservado para Conteúdo 2"/>
+          <p:cNvSpPr>
+            <a:spLocks noGrp="1"/>
+          </p:cNvSpPr>
+          <p:nvPr>
+            <p:ph idx="1"/>
+          </p:nvPr>
+        </p:nvSpPr>
+        <p:spPr/>
+        <p:txBody>
+          <a:bodyPr numCol="1">
+            <a:normAutofit/>
+          </a:bodyPr>
+          <a:lstStyle/>
+          <a:p>
+            <a:pPr fontAlgn="base"/>
+            <a:r>
+              <a:rPr lang="pt-BR" dirty="0" smtClean="0"/>
+              <a:t>Criando </a:t>
+            </a:r>
+            <a:r>
+              <a:rPr lang="pt-BR" dirty="0"/>
+              <a:t>um </a:t>
+            </a:r>
+            <a:r>
+              <a:rPr lang="pt-BR" dirty="0" err="1"/>
+              <a:t>controller</a:t>
+            </a:r>
+            <a:endParaRPr lang="pt-BR" dirty="0"/>
+          </a:p>
+          <a:p>
+            <a:pPr fontAlgn="base"/>
+            <a:r>
+              <a:rPr lang="pt-BR" dirty="0"/>
+              <a:t>$</a:t>
+            </a:r>
+            <a:r>
+              <a:rPr lang="pt-BR" dirty="0" err="1"/>
+              <a:t>scope</a:t>
+            </a:r>
+            <a:endParaRPr lang="pt-BR" dirty="0"/>
+          </a:p>
+          <a:p>
+            <a:pPr fontAlgn="base"/>
+            <a:r>
+              <a:rPr lang="pt-BR" dirty="0"/>
+              <a:t>NG-</a:t>
+            </a:r>
+            <a:r>
+              <a:rPr lang="pt-BR" dirty="0" err="1"/>
+              <a:t>controller</a:t>
+            </a:r>
+            <a:endParaRPr lang="pt-BR" dirty="0"/>
+          </a:p>
+          <a:p>
+            <a:pPr fontAlgn="base"/>
+            <a:r>
+              <a:rPr lang="pt-BR" dirty="0" err="1"/>
+              <a:t>Ng</a:t>
+            </a:r>
+            <a:r>
+              <a:rPr lang="pt-BR" dirty="0"/>
+              <a:t>-click</a:t>
+            </a:r>
           </a:p>
         </p:txBody>
       </p:sp>
     </p:spTree>
     <p:extLst>
       <p:ext uri="{BB962C8B-B14F-4D97-AF65-F5344CB8AC3E}">
-        <p14:creationId xmlns:p14="http://schemas.microsoft.com/office/powerpoint/2010/main" val="2713542278"/>
+        <p14:creationId xmlns:p14="http://schemas.microsoft.com/office/powerpoint/2010/main" val="220843279"/>
       </p:ext>
     </p:extLst>
   </p:cSld>
@@ -5840,7 +7060,7 @@
   <a:extraClrSchemeLst/>
   <a:extLst>
     <a:ext uri="{05A4C25C-085E-4340-85A3-A5531E510DB2}">
-      <thm15:themeFamily xmlns="" xmlns:thm15="http://schemas.microsoft.com/office/thememl/2012/main" name="Office Theme" id="{62F939B6-93AF-4DB8-9C6B-D6C7DFDC589F}" vid="{4A3C46E8-61CC-4603-A589-7422A47A8E4A}"/>
+      <thm15:themeFamily xmlns:thm15="http://schemas.microsoft.com/office/thememl/2012/main" xmlns="" name="Office Theme" id="{62F939B6-93AF-4DB8-9C6B-D6C7DFDC589F}" vid="{4A3C46E8-61CC-4603-A589-7422A47A8E4A}"/>
     </a:ext>
   </a:extLst>
 </a:theme>

</xml_diff>